<commit_message>
Intro to recursion updated
</commit_message>
<xml_diff>
--- a/slides/On-Campus/11_01_IntrotoRecursion.pptx
+++ b/slides/On-Campus/11_01_IntrotoRecursion.pptx
@@ -146,536 +146,48 @@
 <pc:chgInfo xmlns:a="http://schemas.openxmlformats.org/drawingml/2006/main" xmlns:r="http://schemas.openxmlformats.org/officeDocument/2006/relationships" xmlns:ac="http://schemas.microsoft.com/office/drawing/2013/main/command" xmlns:pc="http://schemas.microsoft.com/office/powerpoint/2013/main/command">
   <pc:docChgLst>
     <pc:chgData name="Marcia Moraes" userId="c9c67e8a-58e2-4733-9a1c-5d44fec4775b" providerId="ADAL" clId="{4F6C7877-AAB2-41F0-BC38-54B934F216FC}"/>
-    <pc:docChg chg="undo custSel addSld modSld sldOrd">
-      <pc:chgData name="Marcia Moraes" userId="c9c67e8a-58e2-4733-9a1c-5d44fec4775b" providerId="ADAL" clId="{4F6C7877-AAB2-41F0-BC38-54B934F216FC}" dt="2023-03-30T18:31:11.001" v="493" actId="14100"/>
+  </pc:docChgLst>
+  <pc:docChgLst>
+    <pc:chgData name="Moraes,Marcia" userId="c9c67e8a-58e2-4733-9a1c-5d44fec4775b" providerId="ADAL" clId="{D46B2D66-2AB5-4621-97C6-245206718DFE}"/>
+  </pc:docChgLst>
+  <pc:docChgLst>
+    <pc:chgData name="Moraes,Marcia" userId="c9c67e8a-58e2-4733-9a1c-5d44fec4775b" providerId="ADAL" clId="{CEFF854B-7319-457A-B517-E5AAFFCE5BDD}"/>
+    <pc:docChg chg="custSel modSld">
+      <pc:chgData name="Moraes,Marcia" userId="c9c67e8a-58e2-4733-9a1c-5d44fec4775b" providerId="ADAL" clId="{CEFF854B-7319-457A-B517-E5AAFFCE5BDD}" dt="2023-10-27T18:29:40.929" v="3" actId="1076"/>
       <pc:docMkLst>
         <pc:docMk/>
       </pc:docMkLst>
-      <pc:sldChg chg="modSp">
-        <pc:chgData name="Marcia Moraes" userId="c9c67e8a-58e2-4733-9a1c-5d44fec4775b" providerId="ADAL" clId="{4F6C7877-AAB2-41F0-BC38-54B934F216FC}" dt="2023-03-30T18:22:03.421" v="313" actId="1076"/>
-        <pc:sldMkLst>
-          <pc:docMk/>
-          <pc:sldMk cId="706310142" sldId="257"/>
-        </pc:sldMkLst>
-        <pc:spChg chg="mod">
-          <ac:chgData name="Marcia Moraes" userId="c9c67e8a-58e2-4733-9a1c-5d44fec4775b" providerId="ADAL" clId="{4F6C7877-AAB2-41F0-BC38-54B934F216FC}" dt="2023-03-30T18:21:15.078" v="301" actId="1076"/>
-          <ac:spMkLst>
-            <pc:docMk/>
-            <pc:sldMk cId="706310142" sldId="257"/>
-            <ac:spMk id="4" creationId="{F016D7DE-DA0D-D54E-881A-8D82FC15EEDE}"/>
-          </ac:spMkLst>
-        </pc:spChg>
-        <pc:spChg chg="mod">
-          <ac:chgData name="Marcia Moraes" userId="c9c67e8a-58e2-4733-9a1c-5d44fec4775b" providerId="ADAL" clId="{4F6C7877-AAB2-41F0-BC38-54B934F216FC}" dt="2023-03-30T18:21:46.859" v="309" actId="255"/>
-          <ac:spMkLst>
-            <pc:docMk/>
-            <pc:sldMk cId="706310142" sldId="257"/>
-            <ac:spMk id="6" creationId="{B60D51D7-E415-B840-A77B-B31975D4BB6B}"/>
-          </ac:spMkLst>
-        </pc:spChg>
-        <pc:spChg chg="mod">
-          <ac:chgData name="Marcia Moraes" userId="c9c67e8a-58e2-4733-9a1c-5d44fec4775b" providerId="ADAL" clId="{4F6C7877-AAB2-41F0-BC38-54B934F216FC}" dt="2023-03-30T18:21:41.864" v="308" actId="1076"/>
-          <ac:spMkLst>
-            <pc:docMk/>
-            <pc:sldMk cId="706310142" sldId="257"/>
-            <ac:spMk id="14" creationId="{820AECDB-2759-4DA9-BED0-3AE2216596F6}"/>
-          </ac:spMkLst>
-        </pc:spChg>
-        <pc:spChg chg="mod">
-          <ac:chgData name="Marcia Moraes" userId="c9c67e8a-58e2-4733-9a1c-5d44fec4775b" providerId="ADAL" clId="{4F6C7877-AAB2-41F0-BC38-54B934F216FC}" dt="2023-03-30T18:21:31.697" v="305" actId="1076"/>
-          <ac:spMkLst>
-            <pc:docMk/>
-            <pc:sldMk cId="706310142" sldId="257"/>
-            <ac:spMk id="15" creationId="{22E6A680-F032-4B55-BB13-AFAD0DC8C1E4}"/>
-          </ac:spMkLst>
-        </pc:spChg>
-        <pc:spChg chg="mod">
-          <ac:chgData name="Marcia Moraes" userId="c9c67e8a-58e2-4733-9a1c-5d44fec4775b" providerId="ADAL" clId="{4F6C7877-AAB2-41F0-BC38-54B934F216FC}" dt="2023-03-30T18:22:03.421" v="313" actId="1076"/>
-          <ac:spMkLst>
-            <pc:docMk/>
-            <pc:sldMk cId="706310142" sldId="257"/>
-            <ac:spMk id="17" creationId="{85630BF4-A637-492F-8F36-E5FC925F08D0}"/>
-          </ac:spMkLst>
-        </pc:spChg>
-        <pc:spChg chg="mod">
-          <ac:chgData name="Marcia Moraes" userId="c9c67e8a-58e2-4733-9a1c-5d44fec4775b" providerId="ADAL" clId="{4F6C7877-AAB2-41F0-BC38-54B934F216FC}" dt="2023-03-30T18:21:53.294" v="311" actId="255"/>
-          <ac:spMkLst>
-            <pc:docMk/>
-            <pc:sldMk cId="706310142" sldId="257"/>
-            <ac:spMk id="18" creationId="{A968E691-57B2-42AD-9B86-E357DC0F5890}"/>
-          </ac:spMkLst>
-        </pc:spChg>
-      </pc:sldChg>
-      <pc:sldChg chg="modSp">
-        <pc:chgData name="Marcia Moraes" userId="c9c67e8a-58e2-4733-9a1c-5d44fec4775b" providerId="ADAL" clId="{4F6C7877-AAB2-41F0-BC38-54B934F216FC}" dt="2023-03-30T18:18:31.873" v="283" actId="255"/>
-        <pc:sldMkLst>
-          <pc:docMk/>
-          <pc:sldMk cId="2695379060" sldId="259"/>
-        </pc:sldMkLst>
-        <pc:spChg chg="mod">
-          <ac:chgData name="Marcia Moraes" userId="c9c67e8a-58e2-4733-9a1c-5d44fec4775b" providerId="ADAL" clId="{4F6C7877-AAB2-41F0-BC38-54B934F216FC}" dt="2023-03-30T18:17:59.886" v="267" actId="1076"/>
-          <ac:spMkLst>
-            <pc:docMk/>
-            <pc:sldMk cId="2695379060" sldId="259"/>
-            <ac:spMk id="2" creationId="{F97C01CE-51D3-4DFD-9BB7-739F9C97F431}"/>
-          </ac:spMkLst>
-        </pc:spChg>
-        <pc:spChg chg="mod">
-          <ac:chgData name="Marcia Moraes" userId="c9c67e8a-58e2-4733-9a1c-5d44fec4775b" providerId="ADAL" clId="{4F6C7877-AAB2-41F0-BC38-54B934F216FC}" dt="2023-03-30T18:18:13.318" v="271" actId="1076"/>
-          <ac:spMkLst>
-            <pc:docMk/>
-            <pc:sldMk cId="2695379060" sldId="259"/>
-            <ac:spMk id="3" creationId="{B6DC54CF-35F7-43EA-B0F4-366DC5E9A368}"/>
-          </ac:spMkLst>
-        </pc:spChg>
-        <pc:spChg chg="mod">
-          <ac:chgData name="Marcia Moraes" userId="c9c67e8a-58e2-4733-9a1c-5d44fec4775b" providerId="ADAL" clId="{4F6C7877-AAB2-41F0-BC38-54B934F216FC}" dt="2023-03-30T17:49:07.609" v="212" actId="1076"/>
-          <ac:spMkLst>
-            <pc:docMk/>
-            <pc:sldMk cId="2695379060" sldId="259"/>
-            <ac:spMk id="4" creationId="{F016D7DE-DA0D-D54E-881A-8D82FC15EEDE}"/>
-          </ac:spMkLst>
-        </pc:spChg>
-        <pc:spChg chg="mod">
-          <ac:chgData name="Marcia Moraes" userId="c9c67e8a-58e2-4733-9a1c-5d44fec4775b" providerId="ADAL" clId="{4F6C7877-AAB2-41F0-BC38-54B934F216FC}" dt="2023-03-30T17:50:09.423" v="224" actId="255"/>
-          <ac:spMkLst>
-            <pc:docMk/>
-            <pc:sldMk cId="2695379060" sldId="259"/>
-            <ac:spMk id="5" creationId="{446693EF-ADF2-6A45-BA55-47A75C061D4C}"/>
-          </ac:spMkLst>
-        </pc:spChg>
-        <pc:spChg chg="mod">
-          <ac:chgData name="Marcia Moraes" userId="c9c67e8a-58e2-4733-9a1c-5d44fec4775b" providerId="ADAL" clId="{4F6C7877-AAB2-41F0-BC38-54B934F216FC}" dt="2023-03-30T17:50:05.543" v="223" actId="255"/>
-          <ac:spMkLst>
-            <pc:docMk/>
-            <pc:sldMk cId="2695379060" sldId="259"/>
-            <ac:spMk id="6" creationId="{B60D51D7-E415-B840-A77B-B31975D4BB6B}"/>
-          </ac:spMkLst>
-        </pc:spChg>
-        <pc:spChg chg="mod">
-          <ac:chgData name="Marcia Moraes" userId="c9c67e8a-58e2-4733-9a1c-5d44fec4775b" providerId="ADAL" clId="{4F6C7877-AAB2-41F0-BC38-54B934F216FC}" dt="2023-03-30T18:17:48.750" v="256" actId="1076"/>
-          <ac:spMkLst>
-            <pc:docMk/>
-            <pc:sldMk cId="2695379060" sldId="259"/>
-            <ac:spMk id="12" creationId="{E0B85B34-3358-4DF0-806A-799D560EEC22}"/>
-          </ac:spMkLst>
-        </pc:spChg>
-        <pc:spChg chg="mod">
-          <ac:chgData name="Marcia Moraes" userId="c9c67e8a-58e2-4733-9a1c-5d44fec4775b" providerId="ADAL" clId="{4F6C7877-AAB2-41F0-BC38-54B934F216FC}" dt="2023-03-30T18:18:15.934" v="272" actId="1076"/>
-          <ac:spMkLst>
-            <pc:docMk/>
-            <pc:sldMk cId="2695379060" sldId="259"/>
-            <ac:spMk id="16" creationId="{CC8E4C46-4257-467B-893C-EE05F12775DE}"/>
-          </ac:spMkLst>
-        </pc:spChg>
-        <pc:spChg chg="mod">
-          <ac:chgData name="Marcia Moraes" userId="c9c67e8a-58e2-4733-9a1c-5d44fec4775b" providerId="ADAL" clId="{4F6C7877-AAB2-41F0-BC38-54B934F216FC}" dt="2023-03-30T18:18:31.873" v="283" actId="255"/>
-          <ac:spMkLst>
-            <pc:docMk/>
-            <pc:sldMk cId="2695379060" sldId="259"/>
-            <ac:spMk id="17" creationId="{D4E84A94-D14C-4DE6-82E3-D13C2727867A}"/>
-          </ac:spMkLst>
-        </pc:spChg>
-        <pc:spChg chg="mod">
-          <ac:chgData name="Marcia Moraes" userId="c9c67e8a-58e2-4733-9a1c-5d44fec4775b" providerId="ADAL" clId="{4F6C7877-AAB2-41F0-BC38-54B934F216FC}" dt="2023-03-30T17:50:00.018" v="222" actId="255"/>
-          <ac:spMkLst>
-            <pc:docMk/>
-            <pc:sldMk cId="2695379060" sldId="259"/>
-            <ac:spMk id="18" creationId="{34B9CD85-4F9B-4C44-AD29-F49080158152}"/>
-          </ac:spMkLst>
-        </pc:spChg>
-        <pc:spChg chg="mod">
-          <ac:chgData name="Marcia Moraes" userId="c9c67e8a-58e2-4733-9a1c-5d44fec4775b" providerId="ADAL" clId="{4F6C7877-AAB2-41F0-BC38-54B934F216FC}" dt="2023-03-30T17:50:18.766" v="225" actId="1076"/>
-          <ac:spMkLst>
-            <pc:docMk/>
-            <pc:sldMk cId="2695379060" sldId="259"/>
-            <ac:spMk id="20" creationId="{B8DFF3F6-C337-45DA-861C-AC9A96A0BF2E}"/>
-          </ac:spMkLst>
-        </pc:spChg>
-      </pc:sldChg>
-      <pc:sldChg chg="modSp">
-        <pc:chgData name="Marcia Moraes" userId="c9c67e8a-58e2-4733-9a1c-5d44fec4775b" providerId="ADAL" clId="{4F6C7877-AAB2-41F0-BC38-54B934F216FC}" dt="2023-03-30T18:21:00.799" v="300" actId="1076"/>
-        <pc:sldMkLst>
-          <pc:docMk/>
-          <pc:sldMk cId="2716613287" sldId="260"/>
-        </pc:sldMkLst>
-        <pc:spChg chg="mod">
-          <ac:chgData name="Marcia Moraes" userId="c9c67e8a-58e2-4733-9a1c-5d44fec4775b" providerId="ADAL" clId="{4F6C7877-AAB2-41F0-BC38-54B934F216FC}" dt="2023-03-30T18:19:51.190" v="295" actId="1076"/>
-          <ac:spMkLst>
-            <pc:docMk/>
-            <pc:sldMk cId="2716613287" sldId="260"/>
-            <ac:spMk id="4" creationId="{F016D7DE-DA0D-D54E-881A-8D82FC15EEDE}"/>
-          </ac:spMkLst>
-        </pc:spChg>
-        <pc:spChg chg="mod">
-          <ac:chgData name="Marcia Moraes" userId="c9c67e8a-58e2-4733-9a1c-5d44fec4775b" providerId="ADAL" clId="{4F6C7877-AAB2-41F0-BC38-54B934F216FC}" dt="2023-03-30T18:20:52.164" v="298" actId="1076"/>
-          <ac:spMkLst>
-            <pc:docMk/>
-            <pc:sldMk cId="2716613287" sldId="260"/>
-            <ac:spMk id="9" creationId="{78FDD4FC-9816-401D-A7CC-D306B6C016D3}"/>
-          </ac:spMkLst>
-        </pc:spChg>
-        <pc:spChg chg="mod">
-          <ac:chgData name="Marcia Moraes" userId="c9c67e8a-58e2-4733-9a1c-5d44fec4775b" providerId="ADAL" clId="{4F6C7877-AAB2-41F0-BC38-54B934F216FC}" dt="2023-03-30T18:21:00.799" v="300" actId="1076"/>
-          <ac:spMkLst>
-            <pc:docMk/>
-            <pc:sldMk cId="2716613287" sldId="260"/>
-            <ac:spMk id="10" creationId="{86DFCCC9-5F60-4471-B49F-CA8EFECF5DE4}"/>
-          </ac:spMkLst>
-        </pc:spChg>
-        <pc:spChg chg="mod">
-          <ac:chgData name="Marcia Moraes" userId="c9c67e8a-58e2-4733-9a1c-5d44fec4775b" providerId="ADAL" clId="{4F6C7877-AAB2-41F0-BC38-54B934F216FC}" dt="2023-03-30T18:19:56.843" v="296" actId="1076"/>
-          <ac:spMkLst>
-            <pc:docMk/>
-            <pc:sldMk cId="2716613287" sldId="260"/>
-            <ac:spMk id="13" creationId="{5DE45209-5299-4909-8268-7548D361CE07}"/>
-          </ac:spMkLst>
-        </pc:spChg>
-        <pc:spChg chg="mod">
-          <ac:chgData name="Marcia Moraes" userId="c9c67e8a-58e2-4733-9a1c-5d44fec4775b" providerId="ADAL" clId="{4F6C7877-AAB2-41F0-BC38-54B934F216FC}" dt="2023-03-30T18:19:56.843" v="296" actId="1076"/>
-          <ac:spMkLst>
-            <pc:docMk/>
-            <pc:sldMk cId="2716613287" sldId="260"/>
-            <ac:spMk id="15" creationId="{E496EE7A-5F54-4001-A90D-F87E77A6BFC7}"/>
-          </ac:spMkLst>
-        </pc:spChg>
-        <pc:spChg chg="mod">
-          <ac:chgData name="Marcia Moraes" userId="c9c67e8a-58e2-4733-9a1c-5d44fec4775b" providerId="ADAL" clId="{4F6C7877-AAB2-41F0-BC38-54B934F216FC}" dt="2023-03-30T18:19:56.843" v="296" actId="1076"/>
-          <ac:spMkLst>
-            <pc:docMk/>
-            <pc:sldMk cId="2716613287" sldId="260"/>
-            <ac:spMk id="18" creationId="{EA3E712E-E2A7-4000-B24B-49ABA3520C45}"/>
-          </ac:spMkLst>
-        </pc:spChg>
-        <pc:spChg chg="mod">
-          <ac:chgData name="Marcia Moraes" userId="c9c67e8a-58e2-4733-9a1c-5d44fec4775b" providerId="ADAL" clId="{4F6C7877-AAB2-41F0-BC38-54B934F216FC}" dt="2023-03-30T18:19:56.843" v="296" actId="1076"/>
-          <ac:spMkLst>
-            <pc:docMk/>
-            <pc:sldMk cId="2716613287" sldId="260"/>
-            <ac:spMk id="19" creationId="{00223173-FD20-45F5-9E4A-88F6215E5B96}"/>
-          </ac:spMkLst>
-        </pc:spChg>
-        <pc:spChg chg="mod">
-          <ac:chgData name="Marcia Moraes" userId="c9c67e8a-58e2-4733-9a1c-5d44fec4775b" providerId="ADAL" clId="{4F6C7877-AAB2-41F0-BC38-54B934F216FC}" dt="2023-03-30T18:19:56.843" v="296" actId="1076"/>
-          <ac:spMkLst>
-            <pc:docMk/>
-            <pc:sldMk cId="2716613287" sldId="260"/>
-            <ac:spMk id="21" creationId="{11CB4C76-67E5-4661-A0E1-B5C84A6D2D30}"/>
-          </ac:spMkLst>
-        </pc:spChg>
-        <pc:spChg chg="mod">
-          <ac:chgData name="Marcia Moraes" userId="c9c67e8a-58e2-4733-9a1c-5d44fec4775b" providerId="ADAL" clId="{4F6C7877-AAB2-41F0-BC38-54B934F216FC}" dt="2023-03-30T18:19:56.843" v="296" actId="1076"/>
-          <ac:spMkLst>
-            <pc:docMk/>
-            <pc:sldMk cId="2716613287" sldId="260"/>
-            <ac:spMk id="22" creationId="{78328DCF-A625-45C1-9F32-4E25156658A4}"/>
-          </ac:spMkLst>
-        </pc:spChg>
-        <pc:spChg chg="mod">
-          <ac:chgData name="Marcia Moraes" userId="c9c67e8a-58e2-4733-9a1c-5d44fec4775b" providerId="ADAL" clId="{4F6C7877-AAB2-41F0-BC38-54B934F216FC}" dt="2023-03-30T18:19:56.843" v="296" actId="1076"/>
-          <ac:spMkLst>
-            <pc:docMk/>
-            <pc:sldMk cId="2716613287" sldId="260"/>
-            <ac:spMk id="24" creationId="{2BEF26C9-69F8-493B-81B1-456D23C054BF}"/>
-          </ac:spMkLst>
-        </pc:spChg>
-        <pc:spChg chg="mod">
-          <ac:chgData name="Marcia Moraes" userId="c9c67e8a-58e2-4733-9a1c-5d44fec4775b" providerId="ADAL" clId="{4F6C7877-AAB2-41F0-BC38-54B934F216FC}" dt="2023-03-30T18:19:56.843" v="296" actId="1076"/>
-          <ac:spMkLst>
-            <pc:docMk/>
-            <pc:sldMk cId="2716613287" sldId="260"/>
-            <ac:spMk id="25" creationId="{C858EBFA-BADA-4C40-B686-1C1BB0C567C1}"/>
-          </ac:spMkLst>
-        </pc:spChg>
-        <pc:spChg chg="mod">
-          <ac:chgData name="Marcia Moraes" userId="c9c67e8a-58e2-4733-9a1c-5d44fec4775b" providerId="ADAL" clId="{4F6C7877-AAB2-41F0-BC38-54B934F216FC}" dt="2023-03-30T18:19:56.843" v="296" actId="1076"/>
-          <ac:spMkLst>
-            <pc:docMk/>
-            <pc:sldMk cId="2716613287" sldId="260"/>
-            <ac:spMk id="27" creationId="{418A4A84-6417-409D-B338-0CE32146912E}"/>
-          </ac:spMkLst>
-        </pc:spChg>
-        <pc:spChg chg="mod">
-          <ac:chgData name="Marcia Moraes" userId="c9c67e8a-58e2-4733-9a1c-5d44fec4775b" providerId="ADAL" clId="{4F6C7877-AAB2-41F0-BC38-54B934F216FC}" dt="2023-03-30T18:19:56.843" v="296" actId="1076"/>
-          <ac:spMkLst>
-            <pc:docMk/>
-            <pc:sldMk cId="2716613287" sldId="260"/>
-            <ac:spMk id="28" creationId="{8451F2D5-9F64-4DD0-B115-1175278E5AFE}"/>
-          </ac:spMkLst>
-        </pc:spChg>
-        <pc:spChg chg="mod">
-          <ac:chgData name="Marcia Moraes" userId="c9c67e8a-58e2-4733-9a1c-5d44fec4775b" providerId="ADAL" clId="{4F6C7877-AAB2-41F0-BC38-54B934F216FC}" dt="2023-03-30T18:19:56.843" v="296" actId="1076"/>
-          <ac:spMkLst>
-            <pc:docMk/>
-            <pc:sldMk cId="2716613287" sldId="260"/>
-            <ac:spMk id="29" creationId="{091A25E5-5046-4291-8B20-B9DADB017A3E}"/>
-          </ac:spMkLst>
-        </pc:spChg>
-        <pc:spChg chg="mod">
-          <ac:chgData name="Marcia Moraes" userId="c9c67e8a-58e2-4733-9a1c-5d44fec4775b" providerId="ADAL" clId="{4F6C7877-AAB2-41F0-BC38-54B934F216FC}" dt="2023-03-30T18:19:56.843" v="296" actId="1076"/>
-          <ac:spMkLst>
-            <pc:docMk/>
-            <pc:sldMk cId="2716613287" sldId="260"/>
-            <ac:spMk id="30" creationId="{046A83E9-EF2A-4442-A0A5-0651F829CDFB}"/>
-          </ac:spMkLst>
-        </pc:spChg>
-        <pc:spChg chg="mod">
-          <ac:chgData name="Marcia Moraes" userId="c9c67e8a-58e2-4733-9a1c-5d44fec4775b" providerId="ADAL" clId="{4F6C7877-AAB2-41F0-BC38-54B934F216FC}" dt="2023-03-30T18:19:56.843" v="296" actId="1076"/>
-          <ac:spMkLst>
-            <pc:docMk/>
-            <pc:sldMk cId="2716613287" sldId="260"/>
-            <ac:spMk id="35" creationId="{E1C7956F-A715-4E72-8F87-C8184273828E}"/>
-          </ac:spMkLst>
-        </pc:spChg>
-        <pc:spChg chg="mod">
-          <ac:chgData name="Marcia Moraes" userId="c9c67e8a-58e2-4733-9a1c-5d44fec4775b" providerId="ADAL" clId="{4F6C7877-AAB2-41F0-BC38-54B934F216FC}" dt="2023-03-30T18:19:56.843" v="296" actId="1076"/>
-          <ac:spMkLst>
-            <pc:docMk/>
-            <pc:sldMk cId="2716613287" sldId="260"/>
-            <ac:spMk id="36" creationId="{63684BEB-4721-440D-BAAE-04152BE2D08D}"/>
-          </ac:spMkLst>
-        </pc:spChg>
-        <pc:spChg chg="mod">
-          <ac:chgData name="Marcia Moraes" userId="c9c67e8a-58e2-4733-9a1c-5d44fec4775b" providerId="ADAL" clId="{4F6C7877-AAB2-41F0-BC38-54B934F216FC}" dt="2023-03-30T18:19:56.843" v="296" actId="1076"/>
-          <ac:spMkLst>
-            <pc:docMk/>
-            <pc:sldMk cId="2716613287" sldId="260"/>
-            <ac:spMk id="37" creationId="{BE1BBF4D-5E91-431A-B98E-F7C211895B22}"/>
-          </ac:spMkLst>
-        </pc:spChg>
-        <pc:spChg chg="mod">
-          <ac:chgData name="Marcia Moraes" userId="c9c67e8a-58e2-4733-9a1c-5d44fec4775b" providerId="ADAL" clId="{4F6C7877-AAB2-41F0-BC38-54B934F216FC}" dt="2023-03-30T18:19:56.843" v="296" actId="1076"/>
-          <ac:spMkLst>
-            <pc:docMk/>
-            <pc:sldMk cId="2716613287" sldId="260"/>
-            <ac:spMk id="38" creationId="{2D4297F6-11A2-4AF8-95FE-A243ECD48154}"/>
-          </ac:spMkLst>
-        </pc:spChg>
-        <pc:spChg chg="mod">
-          <ac:chgData name="Marcia Moraes" userId="c9c67e8a-58e2-4733-9a1c-5d44fec4775b" providerId="ADAL" clId="{4F6C7877-AAB2-41F0-BC38-54B934F216FC}" dt="2023-03-30T18:19:56.843" v="296" actId="1076"/>
-          <ac:spMkLst>
-            <pc:docMk/>
-            <pc:sldMk cId="2716613287" sldId="260"/>
-            <ac:spMk id="39" creationId="{2D497C2B-8888-4C39-9404-A22BFBEDCE29}"/>
-          </ac:spMkLst>
-        </pc:spChg>
-        <pc:picChg chg="mod">
-          <ac:chgData name="Marcia Moraes" userId="c9c67e8a-58e2-4733-9a1c-5d44fec4775b" providerId="ADAL" clId="{4F6C7877-AAB2-41F0-BC38-54B934F216FC}" dt="2023-03-30T18:20:58.888" v="299" actId="1076"/>
-          <ac:picMkLst>
-            <pc:docMk/>
-            <pc:sldMk cId="2716613287" sldId="260"/>
-            <ac:picMk id="40" creationId="{63A3E2DE-2E3E-4B48-972F-2AD857B42B5D}"/>
-          </ac:picMkLst>
-        </pc:picChg>
-      </pc:sldChg>
-      <pc:sldChg chg="modSp">
-        <pc:chgData name="Marcia Moraes" userId="c9c67e8a-58e2-4733-9a1c-5d44fec4775b" providerId="ADAL" clId="{4F6C7877-AAB2-41F0-BC38-54B934F216FC}" dt="2023-03-30T18:30:06.382" v="320" actId="1076"/>
-        <pc:sldMkLst>
-          <pc:docMk/>
-          <pc:sldMk cId="3962554218" sldId="268"/>
-        </pc:sldMkLst>
-        <pc:spChg chg="mod">
-          <ac:chgData name="Marcia Moraes" userId="c9c67e8a-58e2-4733-9a1c-5d44fec4775b" providerId="ADAL" clId="{4F6C7877-AAB2-41F0-BC38-54B934F216FC}" dt="2023-03-30T18:30:00.808" v="318" actId="255"/>
-          <ac:spMkLst>
-            <pc:docMk/>
-            <pc:sldMk cId="3962554218" sldId="268"/>
-            <ac:spMk id="6" creationId="{B60D51D7-E415-B840-A77B-B31975D4BB6B}"/>
-          </ac:spMkLst>
-        </pc:spChg>
-        <pc:spChg chg="mod">
-          <ac:chgData name="Marcia Moraes" userId="c9c67e8a-58e2-4733-9a1c-5d44fec4775b" providerId="ADAL" clId="{4F6C7877-AAB2-41F0-BC38-54B934F216FC}" dt="2023-03-30T18:30:04.400" v="319" actId="1076"/>
-          <ac:spMkLst>
-            <pc:docMk/>
-            <pc:sldMk cId="3962554218" sldId="268"/>
-            <ac:spMk id="14" creationId="{820AECDB-2759-4DA9-BED0-3AE2216596F6}"/>
-          </ac:spMkLst>
-        </pc:spChg>
-        <pc:spChg chg="mod">
-          <ac:chgData name="Marcia Moraes" userId="c9c67e8a-58e2-4733-9a1c-5d44fec4775b" providerId="ADAL" clId="{4F6C7877-AAB2-41F0-BC38-54B934F216FC}" dt="2023-03-30T18:30:06.382" v="320" actId="1076"/>
-          <ac:spMkLst>
-            <pc:docMk/>
-            <pc:sldMk cId="3962554218" sldId="268"/>
-            <ac:spMk id="15" creationId="{22E6A680-F032-4B55-BB13-AFAD0DC8C1E4}"/>
-          </ac:spMkLst>
-        </pc:spChg>
-      </pc:sldChg>
       <pc:sldChg chg="addSp delSp modSp">
-        <pc:chgData name="Marcia Moraes" userId="c9c67e8a-58e2-4733-9a1c-5d44fec4775b" providerId="ADAL" clId="{4F6C7877-AAB2-41F0-BC38-54B934F216FC}" dt="2023-03-30T17:31:45.253" v="208" actId="14100"/>
+        <pc:chgData name="Moraes,Marcia" userId="c9c67e8a-58e2-4733-9a1c-5d44fec4775b" providerId="ADAL" clId="{CEFF854B-7319-457A-B517-E5AAFFCE5BDD}" dt="2023-10-27T18:29:40.929" v="3" actId="1076"/>
         <pc:sldMkLst>
           <pc:docMk/>
           <pc:sldMk cId="2571368551" sldId="272"/>
         </pc:sldMkLst>
-        <pc:spChg chg="mod">
-          <ac:chgData name="Marcia Moraes" userId="c9c67e8a-58e2-4733-9a1c-5d44fec4775b" providerId="ADAL" clId="{4F6C7877-AAB2-41F0-BC38-54B934F216FC}" dt="2023-03-30T17:31:45.253" v="208" actId="14100"/>
+        <pc:spChg chg="del">
+          <ac:chgData name="Moraes,Marcia" userId="c9c67e8a-58e2-4733-9a1c-5d44fec4775b" providerId="ADAL" clId="{CEFF854B-7319-457A-B517-E5AAFFCE5BDD}" dt="2023-10-27T18:29:29.664" v="0" actId="478"/>
           <ac:spMkLst>
             <pc:docMk/>
             <pc:sldMk cId="2571368551" sldId="272"/>
-            <ac:spMk id="2" creationId="{84CD52E7-9878-46B0-B322-12FDC9581986}"/>
+            <ac:spMk id="5" creationId="{1E54CBCD-3447-4F03-970A-F1628F46BEF2}"/>
           </ac:spMkLst>
         </pc:spChg>
         <pc:spChg chg="add mod">
-          <ac:chgData name="Marcia Moraes" userId="c9c67e8a-58e2-4733-9a1c-5d44fec4775b" providerId="ADAL" clId="{4F6C7877-AAB2-41F0-BC38-54B934F216FC}" dt="2023-03-30T16:58:29.080" v="179" actId="207"/>
+          <ac:chgData name="Moraes,Marcia" userId="c9c67e8a-58e2-4733-9a1c-5d44fec4775b" providerId="ADAL" clId="{CEFF854B-7319-457A-B517-E5AAFFCE5BDD}" dt="2023-10-27T18:29:40.929" v="3" actId="1076"/>
           <ac:spMkLst>
             <pc:docMk/>
             <pc:sldMk cId="2571368551" sldId="272"/>
-            <ac:spMk id="3" creationId="{5BC8B290-6C99-4763-BFC6-1EFE67A8FC35}"/>
+            <ac:spMk id="8" creationId="{DFC26188-D9E5-4021-ABA1-46B7AC8382B4}"/>
           </ac:spMkLst>
         </pc:spChg>
-        <pc:spChg chg="add del">
-          <ac:chgData name="Marcia Moraes" userId="c9c67e8a-58e2-4733-9a1c-5d44fec4775b" providerId="ADAL" clId="{4F6C7877-AAB2-41F0-BC38-54B934F216FC}" dt="2023-03-30T17:18:55.412" v="183"/>
-          <ac:spMkLst>
+        <pc:graphicFrameChg chg="add">
+          <ac:chgData name="Moraes,Marcia" userId="c9c67e8a-58e2-4733-9a1c-5d44fec4775b" providerId="ADAL" clId="{CEFF854B-7319-457A-B517-E5AAFFCE5BDD}" dt="2023-10-27T18:29:31.726" v="1"/>
+          <ac:graphicFrameMkLst>
             <pc:docMk/>
             <pc:sldMk cId="2571368551" sldId="272"/>
-            <ac:spMk id="6" creationId="{E65AAD4E-9F02-49FC-B3D4-2A7F9329D3CC}"/>
-          </ac:spMkLst>
-        </pc:spChg>
-        <pc:spChg chg="add del">
-          <ac:chgData name="Marcia Moraes" userId="c9c67e8a-58e2-4733-9a1c-5d44fec4775b" providerId="ADAL" clId="{4F6C7877-AAB2-41F0-BC38-54B934F216FC}" dt="2023-03-30T17:19:04.703" v="185"/>
-          <ac:spMkLst>
-            <pc:docMk/>
-            <pc:sldMk cId="2571368551" sldId="272"/>
-            <ac:spMk id="7" creationId="{868C4D54-0A6F-4E5F-8552-34D904E320C5}"/>
-          </ac:spMkLst>
-        </pc:spChg>
-        <pc:spChg chg="add del mod">
-          <ac:chgData name="Marcia Moraes" userId="c9c67e8a-58e2-4733-9a1c-5d44fec4775b" providerId="ADAL" clId="{4F6C7877-AAB2-41F0-BC38-54B934F216FC}" dt="2023-03-30T17:19:26.416" v="189"/>
-          <ac:spMkLst>
-            <pc:docMk/>
-            <pc:sldMk cId="2571368551" sldId="272"/>
-            <ac:spMk id="8" creationId="{85801493-3182-4FA4-9FB8-CAEB10362D8D}"/>
-          </ac:spMkLst>
-        </pc:spChg>
-        <pc:spChg chg="mod">
-          <ac:chgData name="Marcia Moraes" userId="c9c67e8a-58e2-4733-9a1c-5d44fec4775b" providerId="ADAL" clId="{4F6C7877-AAB2-41F0-BC38-54B934F216FC}" dt="2023-03-30T16:55:18.481" v="36" actId="20577"/>
-          <ac:spMkLst>
-            <pc:docMk/>
-            <pc:sldMk cId="2571368551" sldId="272"/>
-            <ac:spMk id="11" creationId="{BDA0DBC1-29A7-4498-B9AA-9B174D0FEC3E}"/>
-          </ac:spMkLst>
-        </pc:spChg>
-        <pc:picChg chg="add del mod">
-          <ac:chgData name="Marcia Moraes" userId="c9c67e8a-58e2-4733-9a1c-5d44fec4775b" providerId="ADAL" clId="{4F6C7877-AAB2-41F0-BC38-54B934F216FC}" dt="2023-03-30T17:19:42.164" v="193" actId="478"/>
-          <ac:picMkLst>
-            <pc:docMk/>
-            <pc:sldMk cId="2571368551" sldId="272"/>
-            <ac:picMk id="9" creationId="{BE3FBB72-1FE5-4BA9-872E-FB851256B0A4}"/>
-          </ac:picMkLst>
-        </pc:picChg>
-        <pc:picChg chg="add del mod">
-          <ac:chgData name="Marcia Moraes" userId="c9c67e8a-58e2-4733-9a1c-5d44fec4775b" providerId="ADAL" clId="{4F6C7877-AAB2-41F0-BC38-54B934F216FC}" dt="2023-03-30T17:31:11.794" v="199" actId="478"/>
-          <ac:picMkLst>
-            <pc:docMk/>
-            <pc:sldMk cId="2571368551" sldId="272"/>
-            <ac:picMk id="10" creationId="{E2D874D3-41E4-4971-99E2-9513E3F8FAE4}"/>
-          </ac:picMkLst>
-        </pc:picChg>
-        <pc:picChg chg="del mod">
-          <ac:chgData name="Marcia Moraes" userId="c9c67e8a-58e2-4733-9a1c-5d44fec4775b" providerId="ADAL" clId="{4F6C7877-AAB2-41F0-BC38-54B934F216FC}" dt="2023-03-30T17:18:50.706" v="181" actId="478"/>
-          <ac:picMkLst>
-            <pc:docMk/>
-            <pc:sldMk cId="2571368551" sldId="272"/>
-            <ac:picMk id="1026" creationId="{76F90ADF-7BC1-487D-A39C-C9BE9DA546D3}"/>
-          </ac:picMkLst>
-        </pc:picChg>
-        <pc:picChg chg="add mod">
-          <ac:chgData name="Marcia Moraes" userId="c9c67e8a-58e2-4733-9a1c-5d44fec4775b" providerId="ADAL" clId="{4F6C7877-AAB2-41F0-BC38-54B934F216FC}" dt="2023-03-30T17:31:26.305" v="205" actId="1076"/>
-          <ac:picMkLst>
-            <pc:docMk/>
-            <pc:sldMk cId="2571368551" sldId="272"/>
-            <ac:picMk id="1032" creationId="{8F8F76D5-8E26-456C-8557-2CCE2B32A064}"/>
-          </ac:picMkLst>
-        </pc:picChg>
+            <ac:graphicFrameMk id="9" creationId="{5AD38506-2899-456D-86A7-D8B2025A8844}"/>
+          </ac:graphicFrameMkLst>
+        </pc:graphicFrameChg>
       </pc:sldChg>
-      <pc:sldChg chg="delSp modSp add ord">
-        <pc:chgData name="Marcia Moraes" userId="c9c67e8a-58e2-4733-9a1c-5d44fec4775b" providerId="ADAL" clId="{4F6C7877-AAB2-41F0-BC38-54B934F216FC}" dt="2023-03-30T18:31:11.001" v="493" actId="14100"/>
-        <pc:sldMkLst>
-          <pc:docMk/>
-          <pc:sldMk cId="1356595833" sldId="273"/>
-        </pc:sldMkLst>
-        <pc:spChg chg="mod">
-          <ac:chgData name="Marcia Moraes" userId="c9c67e8a-58e2-4733-9a1c-5d44fec4775b" providerId="ADAL" clId="{4F6C7877-AAB2-41F0-BC38-54B934F216FC}" dt="2023-03-30T18:30:29.403" v="335" actId="20577"/>
-          <ac:spMkLst>
-            <pc:docMk/>
-            <pc:sldMk cId="1356595833" sldId="273"/>
-            <ac:spMk id="4" creationId="{F016D7DE-DA0D-D54E-881A-8D82FC15EEDE}"/>
-          </ac:spMkLst>
-        </pc:spChg>
-        <pc:spChg chg="del">
-          <ac:chgData name="Marcia Moraes" userId="c9c67e8a-58e2-4733-9a1c-5d44fec4775b" providerId="ADAL" clId="{4F6C7877-AAB2-41F0-BC38-54B934F216FC}" dt="2023-03-30T18:30:34.297" v="336" actId="478"/>
-          <ac:spMkLst>
-            <pc:docMk/>
-            <pc:sldMk cId="1356595833" sldId="273"/>
-            <ac:spMk id="6" creationId="{B60D51D7-E415-B840-A77B-B31975D4BB6B}"/>
-          </ac:spMkLst>
-        </pc:spChg>
-        <pc:spChg chg="mod">
-          <ac:chgData name="Marcia Moraes" userId="c9c67e8a-58e2-4733-9a1c-5d44fec4775b" providerId="ADAL" clId="{4F6C7877-AAB2-41F0-BC38-54B934F216FC}" dt="2023-03-30T18:31:11.001" v="493" actId="14100"/>
-          <ac:spMkLst>
-            <pc:docMk/>
-            <pc:sldMk cId="1356595833" sldId="273"/>
-            <ac:spMk id="14" creationId="{820AECDB-2759-4DA9-BED0-3AE2216596F6}"/>
-          </ac:spMkLst>
-        </pc:spChg>
-        <pc:spChg chg="del">
-          <ac:chgData name="Marcia Moraes" userId="c9c67e8a-58e2-4733-9a1c-5d44fec4775b" providerId="ADAL" clId="{4F6C7877-AAB2-41F0-BC38-54B934F216FC}" dt="2023-03-30T18:30:37.036" v="337" actId="478"/>
-          <ac:spMkLst>
-            <pc:docMk/>
-            <pc:sldMk cId="1356595833" sldId="273"/>
-            <ac:spMk id="15" creationId="{22E6A680-F032-4B55-BB13-AFAD0DC8C1E4}"/>
-          </ac:spMkLst>
-        </pc:spChg>
-      </pc:sldChg>
-    </pc:docChg>
-  </pc:docChgLst>
-  <pc:docChgLst>
-    <pc:chgData name="Moraes,Marcia" userId="c9c67e8a-58e2-4733-9a1c-5d44fec4775b" providerId="ADAL" clId="{D46B2D66-2AB5-4621-97C6-245206718DFE}"/>
-    <pc:docChg chg="modMainMaster">
-      <pc:chgData name="Moraes,Marcia" userId="c9c67e8a-58e2-4733-9a1c-5d44fec4775b" providerId="ADAL" clId="{D46B2D66-2AB5-4621-97C6-245206718DFE}" dt="2023-03-30T18:34:34.714" v="58" actId="20577"/>
-      <pc:docMkLst>
-        <pc:docMk/>
-      </pc:docMkLst>
-      <pc:sldMasterChg chg="modSldLayout">
-        <pc:chgData name="Moraes,Marcia" userId="c9c67e8a-58e2-4733-9a1c-5d44fec4775b" providerId="ADAL" clId="{D46B2D66-2AB5-4621-97C6-245206718DFE}" dt="2023-03-30T18:34:34.714" v="58" actId="20577"/>
-        <pc:sldMasterMkLst>
-          <pc:docMk/>
-          <pc:sldMasterMk cId="3965733437" sldId="2147483648"/>
-        </pc:sldMasterMkLst>
-        <pc:sldLayoutChg chg="modSp">
-          <pc:chgData name="Moraes,Marcia" userId="c9c67e8a-58e2-4733-9a1c-5d44fec4775b" providerId="ADAL" clId="{D46B2D66-2AB5-4621-97C6-245206718DFE}" dt="2023-03-30T18:34:34.714" v="58" actId="20577"/>
-          <pc:sldLayoutMkLst>
-            <pc:docMk/>
-            <pc:sldMasterMk cId="3965733437" sldId="2147483648"/>
-            <pc:sldLayoutMk cId="0" sldId="2147483689"/>
-          </pc:sldLayoutMkLst>
-          <pc:spChg chg="mod">
-            <ac:chgData name="Moraes,Marcia" userId="c9c67e8a-58e2-4733-9a1c-5d44fec4775b" providerId="ADAL" clId="{D46B2D66-2AB5-4621-97C6-245206718DFE}" dt="2023-03-30T18:34:15.005" v="1" actId="1076"/>
-            <ac:spMkLst>
-              <pc:docMk/>
-              <pc:sldMasterMk cId="3965733437" sldId="2147483648"/>
-              <pc:sldLayoutMk cId="0" sldId="2147483689"/>
-              <ac:spMk id="9" creationId="{518974DB-51D0-2C49-9088-48CE2D84AB1C}"/>
-            </ac:spMkLst>
-          </pc:spChg>
-          <pc:spChg chg="mod">
-            <ac:chgData name="Moraes,Marcia" userId="c9c67e8a-58e2-4733-9a1c-5d44fec4775b" providerId="ADAL" clId="{D46B2D66-2AB5-4621-97C6-245206718DFE}" dt="2023-03-30T18:34:34.714" v="58" actId="20577"/>
-            <ac:spMkLst>
-              <pc:docMk/>
-              <pc:sldMasterMk cId="3965733437" sldId="2147483648"/>
-              <pc:sldLayoutMk cId="0" sldId="2147483689"/>
-              <ac:spMk id="11" creationId="{F621E987-BD36-AF48-B11C-CC4BAD65092F}"/>
-            </ac:spMkLst>
-          </pc:spChg>
-          <pc:picChg chg="mod">
-            <ac:chgData name="Moraes,Marcia" userId="c9c67e8a-58e2-4733-9a1c-5d44fec4775b" providerId="ADAL" clId="{D46B2D66-2AB5-4621-97C6-245206718DFE}" dt="2023-03-30T18:34:12.339" v="0" actId="1076"/>
-            <ac:picMkLst>
-              <pc:docMk/>
-              <pc:sldMasterMk cId="3965733437" sldId="2147483648"/>
-              <pc:sldLayoutMk cId="0" sldId="2147483689"/>
-              <ac:picMk id="7" creationId="{00000000-0000-0000-0000-000000000000}"/>
-            </ac:picMkLst>
-          </pc:picChg>
-        </pc:sldLayoutChg>
-      </pc:sldMasterChg>
     </pc:docChg>
   </pc:docChgLst>
 </pc:chgInfo>
@@ -763,7 +275,7 @@
           <a:p>
             <a:fld id="{4D7E51A5-B478-1E40-8CBB-0DAA8831E99D}" type="datetimeFigureOut">
               <a:rPr lang="en-US" smtClean="0"/>
-              <a:t>3/30/2023</a:t>
+              <a:t>10/27/2023</a:t>
             </a:fld>
             <a:endParaRPr lang="en-US"/>
           </a:p>
@@ -928,7 +440,7 @@
           <a:p>
             <a:fld id="{D0ED587F-861E-6740-9643-E3DDAE89B8D6}" type="datetimeFigureOut">
               <a:rPr lang="en-US" smtClean="0"/>
-              <a:t>3/30/2023</a:t>
+              <a:t>10/27/2023</a:t>
             </a:fld>
             <a:endParaRPr lang="en-US"/>
           </a:p>
@@ -14768,427 +14280,6 @@
       </p:sp>
       <p:sp>
         <p:nvSpPr>
-          <p:cNvPr id="5" name="TextBox 4">
-            <a:extLst>
-              <a:ext uri="{FF2B5EF4-FFF2-40B4-BE49-F238E27FC236}">
-                <a16:creationId xmlns:a16="http://schemas.microsoft.com/office/drawing/2014/main" id="{1E54CBCD-3447-4F03-970A-F1628F46BEF2}"/>
-              </a:ext>
-            </a:extLst>
-          </p:cNvPr>
-          <p:cNvSpPr txBox="1"/>
-          <p:nvPr/>
-        </p:nvSpPr>
-        <p:spPr>
-          <a:xfrm>
-            <a:off x="10570030" y="3886200"/>
-            <a:ext cx="3069770" cy="3477875"/>
-          </a:xfrm>
-          <a:prstGeom prst="rect">
-            <a:avLst/>
-          </a:prstGeom>
-          <a:solidFill>
-            <a:schemeClr val="bg2">
-              <a:lumMod val="40000"/>
-              <a:lumOff val="60000"/>
-            </a:schemeClr>
-          </a:solidFill>
-        </p:spPr>
-        <p:txBody>
-          <a:bodyPr wrap="square" rtlCol="0">
-            <a:spAutoFit/>
-          </a:bodyPr>
-          <a:lstStyle/>
-          <a:p>
-            <a:pPr marL="0" marR="0" lvl="0" indent="0" algn="l" defTabSz="509292" rtl="0" eaLnBrk="1" fontAlgn="auto" latinLnBrk="0" hangingPunct="1">
-              <a:lnSpc>
-                <a:spcPct val="100000"/>
-              </a:lnSpc>
-              <a:spcBef>
-                <a:spcPts val="0"/>
-              </a:spcBef>
-              <a:spcAft>
-                <a:spcPts val="0"/>
-              </a:spcAft>
-              <a:buClrTx/>
-              <a:buSzTx/>
-              <a:buFontTx/>
-              <a:buNone/>
-              <a:tabLst/>
-              <a:defRPr/>
-            </a:pPr>
-            <a:r>
-              <a:rPr kumimoji="0" lang="en-US" sz="2000" b="0" i="0" u="none" strike="noStrike" kern="1200" cap="none" spc="0" normalizeH="0" baseline="0" noProof="0" dirty="0">
-                <a:ln>
-                  <a:noFill/>
-                </a:ln>
-                <a:solidFill>
-                  <a:srgbClr val="000000"/>
-                </a:solidFill>
-                <a:effectLst/>
-                <a:uLnTx/>
-                <a:uFillTx/>
-                <a:latin typeface="Arial" panose="020B0604020202020204"/>
-                <a:ea typeface="+mn-ea"/>
-                <a:cs typeface="+mn-cs"/>
-              </a:rPr>
-              <a:t>Monday Help Desk – </a:t>
-            </a:r>
-          </a:p>
-          <a:p>
-            <a:pPr marL="0" marR="0" lvl="0" indent="0" algn="l" defTabSz="509292" rtl="0" eaLnBrk="1" fontAlgn="auto" latinLnBrk="0" hangingPunct="1">
-              <a:lnSpc>
-                <a:spcPct val="100000"/>
-              </a:lnSpc>
-              <a:spcBef>
-                <a:spcPts val="0"/>
-              </a:spcBef>
-              <a:spcAft>
-                <a:spcPts val="0"/>
-              </a:spcAft>
-              <a:buClrTx/>
-              <a:buSzTx/>
-              <a:buFontTx/>
-              <a:buNone/>
-              <a:tabLst/>
-              <a:defRPr/>
-            </a:pPr>
-            <a:r>
-              <a:rPr kumimoji="0" lang="en-US" sz="2000" b="0" i="0" u="none" strike="noStrike" kern="1200" cap="none" spc="0" normalizeH="0" baseline="0" noProof="0" dirty="0">
-                <a:ln>
-                  <a:noFill/>
-                </a:ln>
-                <a:solidFill>
-                  <a:srgbClr val="000000"/>
-                </a:solidFill>
-                <a:effectLst/>
-                <a:uLnTx/>
-                <a:uFillTx/>
-                <a:latin typeface="Arial" panose="020B0604020202020204"/>
-                <a:ea typeface="+mn-ea"/>
-                <a:cs typeface="+mn-cs"/>
-              </a:rPr>
-              <a:t>12-2pm CSB120</a:t>
-            </a:r>
-          </a:p>
-          <a:p>
-            <a:pPr marL="0" marR="0" lvl="0" indent="0" algn="l" defTabSz="509292" rtl="0" eaLnBrk="1" fontAlgn="auto" latinLnBrk="0" hangingPunct="1">
-              <a:lnSpc>
-                <a:spcPct val="100000"/>
-              </a:lnSpc>
-              <a:spcBef>
-                <a:spcPts val="0"/>
-              </a:spcBef>
-              <a:spcAft>
-                <a:spcPts val="0"/>
-              </a:spcAft>
-              <a:buClrTx/>
-              <a:buSzTx/>
-              <a:buFontTx/>
-              <a:buNone/>
-              <a:tabLst/>
-              <a:defRPr/>
-            </a:pPr>
-            <a:endParaRPr kumimoji="0" lang="en-US" sz="2000" b="0" i="0" u="none" strike="noStrike" kern="1200" cap="none" spc="0" normalizeH="0" baseline="0" noProof="0" dirty="0">
-              <a:ln>
-                <a:noFill/>
-              </a:ln>
-              <a:solidFill>
-                <a:srgbClr val="000000"/>
-              </a:solidFill>
-              <a:effectLst/>
-              <a:uLnTx/>
-              <a:uFillTx/>
-              <a:latin typeface="Arial" panose="020B0604020202020204"/>
-              <a:ea typeface="+mn-ea"/>
-              <a:cs typeface="+mn-cs"/>
-            </a:endParaRPr>
-          </a:p>
-          <a:p>
-            <a:pPr marL="0" marR="0" lvl="0" indent="0" algn="l" defTabSz="509292" rtl="0" eaLnBrk="1" fontAlgn="auto" latinLnBrk="0" hangingPunct="1">
-              <a:lnSpc>
-                <a:spcPct val="100000"/>
-              </a:lnSpc>
-              <a:spcBef>
-                <a:spcPts val="0"/>
-              </a:spcBef>
-              <a:spcAft>
-                <a:spcPts val="0"/>
-              </a:spcAft>
-              <a:buClrTx/>
-              <a:buSzTx/>
-              <a:buFontTx/>
-              <a:buNone/>
-              <a:tabLst/>
-              <a:defRPr/>
-            </a:pPr>
-            <a:r>
-              <a:rPr kumimoji="0" lang="en-US" sz="2000" b="0" i="0" u="none" strike="noStrike" kern="1200" cap="none" spc="0" normalizeH="0" baseline="0" noProof="0" dirty="0">
-                <a:ln>
-                  <a:noFill/>
-                </a:ln>
-                <a:solidFill>
-                  <a:srgbClr val="000000"/>
-                </a:solidFill>
-                <a:effectLst/>
-                <a:uLnTx/>
-                <a:uFillTx/>
-                <a:latin typeface="Arial" panose="020B0604020202020204"/>
-                <a:ea typeface="+mn-ea"/>
-                <a:cs typeface="+mn-cs"/>
-              </a:rPr>
-              <a:t>Monday Help Session – </a:t>
-            </a:r>
-          </a:p>
-          <a:p>
-            <a:pPr marL="0" marR="0" lvl="0" indent="0" algn="l" defTabSz="509292" rtl="0" eaLnBrk="1" fontAlgn="auto" latinLnBrk="0" hangingPunct="1">
-              <a:lnSpc>
-                <a:spcPct val="100000"/>
-              </a:lnSpc>
-              <a:spcBef>
-                <a:spcPts val="0"/>
-              </a:spcBef>
-              <a:spcAft>
-                <a:spcPts val="0"/>
-              </a:spcAft>
-              <a:buClrTx/>
-              <a:buSzTx/>
-              <a:buFontTx/>
-              <a:buNone/>
-              <a:tabLst/>
-              <a:defRPr/>
-            </a:pPr>
-            <a:r>
-              <a:rPr kumimoji="0" lang="en-US" sz="2000" b="0" i="0" u="none" strike="noStrike" kern="1200" cap="none" spc="0" normalizeH="0" baseline="0" noProof="0" dirty="0">
-                <a:ln>
-                  <a:noFill/>
-                </a:ln>
-                <a:solidFill>
-                  <a:srgbClr val="000000"/>
-                </a:solidFill>
-                <a:effectLst/>
-                <a:uLnTx/>
-                <a:uFillTx/>
-                <a:latin typeface="Arial" panose="020B0604020202020204"/>
-                <a:ea typeface="+mn-ea"/>
-                <a:cs typeface="+mn-cs"/>
-              </a:rPr>
-              <a:t>3-4pm CSB325</a:t>
-            </a:r>
-          </a:p>
-          <a:p>
-            <a:pPr marL="0" marR="0" lvl="0" indent="0" algn="l" defTabSz="509292" rtl="0" eaLnBrk="1" fontAlgn="auto" latinLnBrk="0" hangingPunct="1">
-              <a:lnSpc>
-                <a:spcPct val="100000"/>
-              </a:lnSpc>
-              <a:spcBef>
-                <a:spcPts val="0"/>
-              </a:spcBef>
-              <a:spcAft>
-                <a:spcPts val="0"/>
-              </a:spcAft>
-              <a:buClrTx/>
-              <a:buSzTx/>
-              <a:buFontTx/>
-              <a:buNone/>
-              <a:tabLst/>
-              <a:defRPr/>
-            </a:pPr>
-            <a:endParaRPr kumimoji="0" lang="en-US" sz="2000" b="0" i="0" u="none" strike="noStrike" kern="1200" cap="none" spc="0" normalizeH="0" baseline="0" noProof="0" dirty="0">
-              <a:ln>
-                <a:noFill/>
-              </a:ln>
-              <a:solidFill>
-                <a:srgbClr val="000000"/>
-              </a:solidFill>
-              <a:effectLst/>
-              <a:uLnTx/>
-              <a:uFillTx/>
-              <a:latin typeface="Arial" panose="020B0604020202020204"/>
-              <a:ea typeface="+mn-ea"/>
-              <a:cs typeface="+mn-cs"/>
-            </a:endParaRPr>
-          </a:p>
-          <a:p>
-            <a:pPr marL="0" marR="0" lvl="0" indent="0" algn="l" defTabSz="509292" rtl="0" eaLnBrk="1" fontAlgn="auto" latinLnBrk="0" hangingPunct="1">
-              <a:lnSpc>
-                <a:spcPct val="100000"/>
-              </a:lnSpc>
-              <a:spcBef>
-                <a:spcPts val="0"/>
-              </a:spcBef>
-              <a:spcAft>
-                <a:spcPts val="0"/>
-              </a:spcAft>
-              <a:buClrTx/>
-              <a:buSzTx/>
-              <a:buFontTx/>
-              <a:buNone/>
-              <a:tabLst/>
-              <a:defRPr/>
-            </a:pPr>
-            <a:r>
-              <a:rPr kumimoji="0" lang="en-US" sz="2000" b="0" i="0" u="none" strike="noStrike" kern="1200" cap="none" spc="0" normalizeH="0" baseline="0" noProof="0" dirty="0">
-                <a:ln>
-                  <a:noFill/>
-                </a:ln>
-                <a:solidFill>
-                  <a:srgbClr val="000000"/>
-                </a:solidFill>
-                <a:effectLst/>
-                <a:uLnTx/>
-                <a:uFillTx/>
-                <a:latin typeface="Arial" panose="020B0604020202020204"/>
-                <a:ea typeface="+mn-ea"/>
-                <a:cs typeface="+mn-cs"/>
-              </a:rPr>
-              <a:t>Tuesday Help Desk – </a:t>
-            </a:r>
-          </a:p>
-          <a:p>
-            <a:pPr marL="0" marR="0" lvl="0" indent="0" algn="l" defTabSz="509292" rtl="0" eaLnBrk="1" fontAlgn="auto" latinLnBrk="0" hangingPunct="1">
-              <a:lnSpc>
-                <a:spcPct val="100000"/>
-              </a:lnSpc>
-              <a:spcBef>
-                <a:spcPts val="0"/>
-              </a:spcBef>
-              <a:spcAft>
-                <a:spcPts val="0"/>
-              </a:spcAft>
-              <a:buClrTx/>
-              <a:buSzTx/>
-              <a:buFontTx/>
-              <a:buNone/>
-              <a:tabLst/>
-              <a:defRPr/>
-            </a:pPr>
-            <a:r>
-              <a:rPr kumimoji="0" lang="en-US" sz="2000" b="0" i="0" u="none" strike="noStrike" kern="1200" cap="none" spc="0" normalizeH="0" baseline="0" noProof="0" dirty="0">
-                <a:ln>
-                  <a:noFill/>
-                </a:ln>
-                <a:solidFill>
-                  <a:srgbClr val="000000"/>
-                </a:solidFill>
-                <a:effectLst/>
-                <a:uLnTx/>
-                <a:uFillTx/>
-                <a:latin typeface="Arial" panose="020B0604020202020204"/>
-                <a:ea typeface="+mn-ea"/>
-                <a:cs typeface="+mn-cs"/>
-              </a:rPr>
-              <a:t>6-8pm Teams</a:t>
-            </a:r>
-          </a:p>
-          <a:p>
-            <a:pPr marL="0" marR="0" lvl="0" indent="0" algn="l" defTabSz="509292" rtl="0" eaLnBrk="1" fontAlgn="auto" latinLnBrk="0" hangingPunct="1">
-              <a:lnSpc>
-                <a:spcPct val="100000"/>
-              </a:lnSpc>
-              <a:spcBef>
-                <a:spcPts val="0"/>
-              </a:spcBef>
-              <a:spcAft>
-                <a:spcPts val="0"/>
-              </a:spcAft>
-              <a:buClrTx/>
-              <a:buSzTx/>
-              <a:buFontTx/>
-              <a:buNone/>
-              <a:tabLst/>
-              <a:defRPr/>
-            </a:pPr>
-            <a:endParaRPr kumimoji="0" lang="en-US" sz="2000" b="0" i="0" u="none" strike="noStrike" kern="1200" cap="none" spc="0" normalizeH="0" baseline="0" noProof="0" dirty="0">
-              <a:ln>
-                <a:noFill/>
-              </a:ln>
-              <a:solidFill>
-                <a:srgbClr val="000000"/>
-              </a:solidFill>
-              <a:effectLst/>
-              <a:uLnTx/>
-              <a:uFillTx/>
-              <a:latin typeface="Arial" panose="020B0604020202020204"/>
-              <a:ea typeface="+mn-ea"/>
-              <a:cs typeface="+mn-cs"/>
-            </a:endParaRPr>
-          </a:p>
-          <a:p>
-            <a:pPr marL="0" marR="0" lvl="0" indent="0" algn="l" defTabSz="509292" rtl="0" eaLnBrk="1" fontAlgn="auto" latinLnBrk="0" hangingPunct="1">
-              <a:lnSpc>
-                <a:spcPct val="100000"/>
-              </a:lnSpc>
-              <a:spcBef>
-                <a:spcPts val="0"/>
-              </a:spcBef>
-              <a:spcAft>
-                <a:spcPts val="0"/>
-              </a:spcAft>
-              <a:buClrTx/>
-              <a:buSzTx/>
-              <a:buFontTx/>
-              <a:buNone/>
-              <a:tabLst/>
-              <a:defRPr/>
-            </a:pPr>
-            <a:r>
-              <a:rPr kumimoji="0" lang="en-US" sz="2000" b="0" i="0" u="none" strike="noStrike" kern="1200" cap="none" spc="0" normalizeH="0" baseline="0" noProof="0" dirty="0">
-                <a:ln>
-                  <a:noFill/>
-                </a:ln>
-                <a:solidFill>
-                  <a:srgbClr val="000000"/>
-                </a:solidFill>
-                <a:effectLst/>
-                <a:uLnTx/>
-                <a:uFillTx/>
-                <a:latin typeface="Arial" panose="020B0604020202020204"/>
-                <a:ea typeface="+mn-ea"/>
-                <a:cs typeface="+mn-cs"/>
-              </a:rPr>
-              <a:t>Tuesday Help Session –</a:t>
-            </a:r>
-          </a:p>
-          <a:p>
-            <a:pPr marL="0" marR="0" lvl="0" indent="0" algn="l" defTabSz="509292" rtl="0" eaLnBrk="1" fontAlgn="auto" latinLnBrk="0" hangingPunct="1">
-              <a:lnSpc>
-                <a:spcPct val="100000"/>
-              </a:lnSpc>
-              <a:spcBef>
-                <a:spcPts val="0"/>
-              </a:spcBef>
-              <a:spcAft>
-                <a:spcPts val="0"/>
-              </a:spcAft>
-              <a:buClrTx/>
-              <a:buSzTx/>
-              <a:buFontTx/>
-              <a:buNone/>
-              <a:tabLst/>
-              <a:defRPr/>
-            </a:pPr>
-            <a:r>
-              <a:rPr kumimoji="0" lang="en-US" sz="2000" b="0" i="0" u="none" strike="noStrike" kern="1200" cap="none" spc="0" normalizeH="0" baseline="0" noProof="0" dirty="0">
-                <a:ln>
-                  <a:noFill/>
-                </a:ln>
-                <a:solidFill>
-                  <a:srgbClr val="000000"/>
-                </a:solidFill>
-                <a:effectLst/>
-                <a:uLnTx/>
-                <a:uFillTx/>
-                <a:latin typeface="Arial" panose="020B0604020202020204"/>
-                <a:ea typeface="+mn-ea"/>
-                <a:cs typeface="+mn-cs"/>
-              </a:rPr>
-              <a:t>10-11am Teams </a:t>
-            </a:r>
-          </a:p>
-        </p:txBody>
-      </p:sp>
-      <p:sp>
-        <p:nvSpPr>
           <p:cNvPr id="3" name="TextBox 2">
             <a:extLst>
               <a:ext uri="{FF2B5EF4-FFF2-40B4-BE49-F238E27FC236}">
@@ -15280,6 +14371,1439 @@
           </a:extLst>
         </p:spPr>
       </p:pic>
+      <p:sp>
+        <p:nvSpPr>
+          <p:cNvPr id="8" name="TextBox 7">
+            <a:extLst>
+              <a:ext uri="{FF2B5EF4-FFF2-40B4-BE49-F238E27FC236}">
+                <a16:creationId xmlns:a16="http://schemas.microsoft.com/office/drawing/2014/main" id="{DFC26188-D9E5-4021-ABA1-46B7AC8382B4}"/>
+              </a:ext>
+            </a:extLst>
+          </p:cNvPr>
+          <p:cNvSpPr txBox="1"/>
+          <p:nvPr/>
+        </p:nvSpPr>
+        <p:spPr>
+          <a:xfrm flipH="1">
+            <a:off x="9942181" y="3648975"/>
+            <a:ext cx="2444933" cy="400110"/>
+          </a:xfrm>
+          <a:prstGeom prst="rect">
+            <a:avLst/>
+          </a:prstGeom>
+          <a:noFill/>
+        </p:spPr>
+        <p:txBody>
+          <a:bodyPr wrap="square" rtlCol="0">
+            <a:spAutoFit/>
+          </a:bodyPr>
+          <a:lstStyle/>
+          <a:p>
+            <a:r>
+              <a:rPr lang="en-US" dirty="0"/>
+              <a:t>Help Desk</a:t>
+            </a:r>
+          </a:p>
+        </p:txBody>
+      </p:sp>
+      <p:graphicFrame>
+        <p:nvGraphicFramePr>
+          <p:cNvPr id="9" name="Table 8">
+            <a:extLst>
+              <a:ext uri="{FF2B5EF4-FFF2-40B4-BE49-F238E27FC236}">
+                <a16:creationId xmlns:a16="http://schemas.microsoft.com/office/drawing/2014/main" id="{5AD38506-2899-456D-86A7-D8B2025A8844}"/>
+              </a:ext>
+            </a:extLst>
+          </p:cNvPr>
+          <p:cNvGraphicFramePr>
+            <a:graphicFrameLocks noGrp="1"/>
+          </p:cNvGraphicFramePr>
+          <p:nvPr>
+            <p:extLst>
+              <p:ext uri="{D42A27DB-BD31-4B8C-83A1-F6EECF244321}">
+                <p14:modId xmlns:p14="http://schemas.microsoft.com/office/powerpoint/2010/main" val="638111064"/>
+              </p:ext>
+            </p:extLst>
+          </p:nvPr>
+        </p:nvGraphicFramePr>
+        <p:xfrm>
+          <a:off x="9987253" y="4063757"/>
+          <a:ext cx="3572199" cy="3253859"/>
+        </p:xfrm>
+        <a:graphic>
+          <a:graphicData uri="http://schemas.openxmlformats.org/drawingml/2006/table">
+            <a:tbl>
+              <a:tblPr firstRow="1">
+                <a:tableStyleId>{5C22544A-7EE6-4342-B048-85BDC9FD1C3A}</a:tableStyleId>
+              </a:tblPr>
+              <a:tblGrid>
+                <a:gridCol w="1105468">
+                  <a:extLst>
+                    <a:ext uri="{9D8B030D-6E8A-4147-A177-3AD203B41FA5}">
+                      <a16:colId xmlns:a16="http://schemas.microsoft.com/office/drawing/2014/main" val="1333462331"/>
+                    </a:ext>
+                  </a:extLst>
+                </a:gridCol>
+                <a:gridCol w="2466731">
+                  <a:extLst>
+                    <a:ext uri="{9D8B030D-6E8A-4147-A177-3AD203B41FA5}">
+                      <a16:colId xmlns:a16="http://schemas.microsoft.com/office/drawing/2014/main" val="668155110"/>
+                    </a:ext>
+                  </a:extLst>
+                </a:gridCol>
+              </a:tblGrid>
+              <a:tr h="165373">
+                <a:tc>
+                  <a:txBody>
+                    <a:bodyPr/>
+                    <a:lstStyle/>
+                    <a:p>
+                      <a:pPr marL="0" marR="0">
+                        <a:lnSpc>
+                          <a:spcPct val="107000"/>
+                        </a:lnSpc>
+                        <a:spcBef>
+                          <a:spcPts val="0"/>
+                        </a:spcBef>
+                        <a:spcAft>
+                          <a:spcPts val="800"/>
+                        </a:spcAft>
+                      </a:pPr>
+                      <a:r>
+                        <a:rPr lang="en-US" sz="1600" dirty="0">
+                          <a:solidFill>
+                            <a:schemeClr val="tx1"/>
+                          </a:solidFill>
+                          <a:effectLst/>
+                        </a:rPr>
+                        <a:t>Day</a:t>
+                      </a:r>
+                      <a:endParaRPr lang="en-US" sz="1600" dirty="0">
+                        <a:solidFill>
+                          <a:schemeClr val="tx1"/>
+                        </a:solidFill>
+                        <a:effectLst/>
+                        <a:latin typeface="Calibri" panose="020F0502020204030204" pitchFamily="34" charset="0"/>
+                        <a:ea typeface="Calibri" panose="020F0502020204030204" pitchFamily="34" charset="0"/>
+                        <a:cs typeface="Times New Roman" panose="02020603050405020304" pitchFamily="18" charset="0"/>
+                      </a:endParaRPr>
+                    </a:p>
+                  </a:txBody>
+                  <a:tcPr marL="15875" marR="15875" marT="15875" marB="15875" anchor="ctr">
+                    <a:lnL w="12700" cap="flat" cmpd="sng" algn="ctr">
+                      <a:solidFill>
+                        <a:schemeClr val="tx1"/>
+                      </a:solidFill>
+                      <a:prstDash val="solid"/>
+                      <a:round/>
+                      <a:headEnd type="none" w="med" len="med"/>
+                      <a:tailEnd type="none" w="med" len="med"/>
+                    </a:lnL>
+                    <a:lnR w="12700" cap="flat" cmpd="sng" algn="ctr">
+                      <a:solidFill>
+                        <a:schemeClr val="tx1"/>
+                      </a:solidFill>
+                      <a:prstDash val="solid"/>
+                      <a:round/>
+                      <a:headEnd type="none" w="med" len="med"/>
+                      <a:tailEnd type="none" w="med" len="med"/>
+                    </a:lnR>
+                    <a:lnT w="12700" cap="flat" cmpd="sng" algn="ctr">
+                      <a:solidFill>
+                        <a:schemeClr val="tx1"/>
+                      </a:solidFill>
+                      <a:prstDash val="solid"/>
+                      <a:round/>
+                      <a:headEnd type="none" w="med" len="med"/>
+                      <a:tailEnd type="none" w="med" len="med"/>
+                    </a:lnT>
+                    <a:lnB w="12700" cap="flat" cmpd="sng" algn="ctr">
+                      <a:solidFill>
+                        <a:schemeClr val="tx1"/>
+                      </a:solidFill>
+                      <a:prstDash val="solid"/>
+                      <a:round/>
+                      <a:headEnd type="none" w="med" len="med"/>
+                      <a:tailEnd type="none" w="med" len="med"/>
+                    </a:lnB>
+                    <a:lnTlToBr w="12700" cmpd="sng">
+                      <a:noFill/>
+                      <a:prstDash val="solid"/>
+                    </a:lnTlToBr>
+                    <a:lnBlToTr w="12700" cmpd="sng">
+                      <a:noFill/>
+                      <a:prstDash val="solid"/>
+                    </a:lnBlToTr>
+                    <a:solidFill>
+                      <a:schemeClr val="bg1"/>
+                    </a:solidFill>
+                  </a:tcPr>
+                </a:tc>
+                <a:tc>
+                  <a:txBody>
+                    <a:bodyPr/>
+                    <a:lstStyle/>
+                    <a:p>
+                      <a:pPr marL="0" marR="0">
+                        <a:lnSpc>
+                          <a:spcPct val="107000"/>
+                        </a:lnSpc>
+                        <a:spcBef>
+                          <a:spcPts val="0"/>
+                        </a:spcBef>
+                        <a:spcAft>
+                          <a:spcPts val="800"/>
+                        </a:spcAft>
+                      </a:pPr>
+                      <a:r>
+                        <a:rPr lang="en-US" sz="1600" dirty="0">
+                          <a:solidFill>
+                            <a:schemeClr val="tx1"/>
+                          </a:solidFill>
+                          <a:effectLst/>
+                        </a:rPr>
+                        <a:t>Time : Room</a:t>
+                      </a:r>
+                      <a:endParaRPr lang="en-US" sz="1600" dirty="0">
+                        <a:solidFill>
+                          <a:schemeClr val="tx1"/>
+                        </a:solidFill>
+                        <a:effectLst/>
+                        <a:latin typeface="Calibri" panose="020F0502020204030204" pitchFamily="34" charset="0"/>
+                        <a:ea typeface="Calibri" panose="020F0502020204030204" pitchFamily="34" charset="0"/>
+                        <a:cs typeface="Times New Roman" panose="02020603050405020304" pitchFamily="18" charset="0"/>
+                      </a:endParaRPr>
+                    </a:p>
+                  </a:txBody>
+                  <a:tcPr marL="15875" marR="15875" marT="15875" marB="15875" anchor="ctr">
+                    <a:lnL w="12700" cap="flat" cmpd="sng" algn="ctr">
+                      <a:solidFill>
+                        <a:schemeClr val="tx1"/>
+                      </a:solidFill>
+                      <a:prstDash val="solid"/>
+                      <a:round/>
+                      <a:headEnd type="none" w="med" len="med"/>
+                      <a:tailEnd type="none" w="med" len="med"/>
+                    </a:lnL>
+                    <a:lnR w="12700" cap="flat" cmpd="sng" algn="ctr">
+                      <a:solidFill>
+                        <a:schemeClr val="tx1"/>
+                      </a:solidFill>
+                      <a:prstDash val="solid"/>
+                      <a:round/>
+                      <a:headEnd type="none" w="med" len="med"/>
+                      <a:tailEnd type="none" w="med" len="med"/>
+                    </a:lnR>
+                    <a:lnT w="12700" cap="flat" cmpd="sng" algn="ctr">
+                      <a:solidFill>
+                        <a:schemeClr val="tx1"/>
+                      </a:solidFill>
+                      <a:prstDash val="solid"/>
+                      <a:round/>
+                      <a:headEnd type="none" w="med" len="med"/>
+                      <a:tailEnd type="none" w="med" len="med"/>
+                    </a:lnT>
+                    <a:lnB w="12700" cap="flat" cmpd="sng" algn="ctr">
+                      <a:solidFill>
+                        <a:schemeClr val="tx1"/>
+                      </a:solidFill>
+                      <a:prstDash val="solid"/>
+                      <a:round/>
+                      <a:headEnd type="none" w="med" len="med"/>
+                      <a:tailEnd type="none" w="med" len="med"/>
+                    </a:lnB>
+                    <a:lnTlToBr w="12700" cmpd="sng">
+                      <a:noFill/>
+                      <a:prstDash val="solid"/>
+                    </a:lnTlToBr>
+                    <a:lnBlToTr w="12700" cmpd="sng">
+                      <a:noFill/>
+                      <a:prstDash val="solid"/>
+                    </a:lnBlToTr>
+                    <a:solidFill>
+                      <a:schemeClr val="bg1"/>
+                    </a:solidFill>
+                  </a:tcPr>
+                </a:tc>
+                <a:extLst>
+                  <a:ext uri="{0D108BD9-81ED-4DB2-BD59-A6C34878D82A}">
+                    <a16:rowId xmlns:a16="http://schemas.microsoft.com/office/drawing/2014/main" val="3093163206"/>
+                  </a:ext>
+                </a:extLst>
+              </a:tr>
+              <a:tr h="581669">
+                <a:tc>
+                  <a:txBody>
+                    <a:bodyPr/>
+                    <a:lstStyle/>
+                    <a:p>
+                      <a:pPr marL="0" marR="0">
+                        <a:lnSpc>
+                          <a:spcPct val="107000"/>
+                        </a:lnSpc>
+                        <a:spcBef>
+                          <a:spcPts val="0"/>
+                        </a:spcBef>
+                        <a:spcAft>
+                          <a:spcPts val="800"/>
+                        </a:spcAft>
+                      </a:pPr>
+                      <a:r>
+                        <a:rPr lang="en-US" sz="1600" dirty="0">
+                          <a:effectLst/>
+                        </a:rPr>
+                        <a:t>Monday</a:t>
+                      </a:r>
+                      <a:endParaRPr lang="en-US" sz="1600" dirty="0">
+                        <a:effectLst/>
+                        <a:latin typeface="Calibri" panose="020F0502020204030204" pitchFamily="34" charset="0"/>
+                        <a:ea typeface="Calibri" panose="020F0502020204030204" pitchFamily="34" charset="0"/>
+                        <a:cs typeface="Times New Roman" panose="02020603050405020304" pitchFamily="18" charset="0"/>
+                      </a:endParaRPr>
+                    </a:p>
+                  </a:txBody>
+                  <a:tcPr marL="15875" marR="15875" marT="15875" marB="15875" anchor="ctr">
+                    <a:lnL w="12700" cap="flat" cmpd="sng" algn="ctr">
+                      <a:solidFill>
+                        <a:schemeClr val="tx1"/>
+                      </a:solidFill>
+                      <a:prstDash val="solid"/>
+                      <a:round/>
+                      <a:headEnd type="none" w="med" len="med"/>
+                      <a:tailEnd type="none" w="med" len="med"/>
+                    </a:lnL>
+                    <a:lnR w="12700" cap="flat" cmpd="sng" algn="ctr">
+                      <a:solidFill>
+                        <a:schemeClr val="tx1"/>
+                      </a:solidFill>
+                      <a:prstDash val="solid"/>
+                      <a:round/>
+                      <a:headEnd type="none" w="med" len="med"/>
+                      <a:tailEnd type="none" w="med" len="med"/>
+                    </a:lnR>
+                    <a:lnT w="12700" cap="flat" cmpd="sng" algn="ctr">
+                      <a:solidFill>
+                        <a:schemeClr val="tx1"/>
+                      </a:solidFill>
+                      <a:prstDash val="solid"/>
+                      <a:round/>
+                      <a:headEnd type="none" w="med" len="med"/>
+                      <a:tailEnd type="none" w="med" len="med"/>
+                    </a:lnT>
+                    <a:lnB w="12700" cap="flat" cmpd="sng" algn="ctr">
+                      <a:solidFill>
+                        <a:schemeClr val="tx1"/>
+                      </a:solidFill>
+                      <a:prstDash val="solid"/>
+                      <a:round/>
+                      <a:headEnd type="none" w="med" len="med"/>
+                      <a:tailEnd type="none" w="med" len="med"/>
+                    </a:lnB>
+                    <a:lnTlToBr w="12700" cmpd="sng">
+                      <a:noFill/>
+                      <a:prstDash val="solid"/>
+                    </a:lnTlToBr>
+                    <a:lnBlToTr w="12700" cmpd="sng">
+                      <a:noFill/>
+                      <a:prstDash val="solid"/>
+                    </a:lnBlToTr>
+                    <a:solidFill>
+                      <a:schemeClr val="bg1"/>
+                    </a:solidFill>
+                  </a:tcPr>
+                </a:tc>
+                <a:tc>
+                  <a:txBody>
+                    <a:bodyPr/>
+                    <a:lstStyle/>
+                    <a:p>
+                      <a:pPr marL="0" marR="0">
+                        <a:lnSpc>
+                          <a:spcPct val="107000"/>
+                        </a:lnSpc>
+                        <a:spcBef>
+                          <a:spcPts val="0"/>
+                        </a:spcBef>
+                        <a:spcAft>
+                          <a:spcPts val="800"/>
+                        </a:spcAft>
+                      </a:pPr>
+                      <a:r>
+                        <a:rPr lang="en-US" sz="1600" dirty="0">
+                          <a:effectLst/>
+                        </a:rPr>
+                        <a:t>12 PM - 2 PM : CSB 120</a:t>
+                      </a:r>
+                      <a:endParaRPr lang="en-US" sz="1600" dirty="0">
+                        <a:effectLst/>
+                        <a:latin typeface="Calibri" panose="020F0502020204030204" pitchFamily="34" charset="0"/>
+                        <a:ea typeface="Calibri" panose="020F0502020204030204" pitchFamily="34" charset="0"/>
+                        <a:cs typeface="Times New Roman" panose="02020603050405020304" pitchFamily="18" charset="0"/>
+                      </a:endParaRPr>
+                    </a:p>
+                  </a:txBody>
+                  <a:tcPr marL="15875" marR="15875" marT="15875" marB="15875" anchor="ctr">
+                    <a:lnL w="12700" cap="flat" cmpd="sng" algn="ctr">
+                      <a:solidFill>
+                        <a:schemeClr val="tx1"/>
+                      </a:solidFill>
+                      <a:prstDash val="solid"/>
+                      <a:round/>
+                      <a:headEnd type="none" w="med" len="med"/>
+                      <a:tailEnd type="none" w="med" len="med"/>
+                    </a:lnL>
+                    <a:lnR w="12700" cap="flat" cmpd="sng" algn="ctr">
+                      <a:solidFill>
+                        <a:schemeClr val="tx1"/>
+                      </a:solidFill>
+                      <a:prstDash val="solid"/>
+                      <a:round/>
+                      <a:headEnd type="none" w="med" len="med"/>
+                      <a:tailEnd type="none" w="med" len="med"/>
+                    </a:lnR>
+                    <a:lnT w="12700" cap="flat" cmpd="sng" algn="ctr">
+                      <a:solidFill>
+                        <a:schemeClr val="tx1"/>
+                      </a:solidFill>
+                      <a:prstDash val="solid"/>
+                      <a:round/>
+                      <a:headEnd type="none" w="med" len="med"/>
+                      <a:tailEnd type="none" w="med" len="med"/>
+                    </a:lnT>
+                    <a:lnB w="12700" cap="flat" cmpd="sng" algn="ctr">
+                      <a:solidFill>
+                        <a:schemeClr val="tx1"/>
+                      </a:solidFill>
+                      <a:prstDash val="solid"/>
+                      <a:round/>
+                      <a:headEnd type="none" w="med" len="med"/>
+                      <a:tailEnd type="none" w="med" len="med"/>
+                    </a:lnB>
+                    <a:lnTlToBr w="12700" cmpd="sng">
+                      <a:noFill/>
+                      <a:prstDash val="solid"/>
+                    </a:lnTlToBr>
+                    <a:lnBlToTr w="12700" cmpd="sng">
+                      <a:noFill/>
+                      <a:prstDash val="solid"/>
+                    </a:lnBlToTr>
+                    <a:solidFill>
+                      <a:schemeClr val="bg1"/>
+                    </a:solidFill>
+                  </a:tcPr>
+                </a:tc>
+                <a:extLst>
+                  <a:ext uri="{0D108BD9-81ED-4DB2-BD59-A6C34878D82A}">
+                    <a16:rowId xmlns:a16="http://schemas.microsoft.com/office/drawing/2014/main" val="1139786997"/>
+                  </a:ext>
+                </a:extLst>
+              </a:tr>
+              <a:tr h="307347">
+                <a:tc>
+                  <a:txBody>
+                    <a:bodyPr/>
+                    <a:lstStyle/>
+                    <a:p>
+                      <a:pPr marL="0" marR="0">
+                        <a:lnSpc>
+                          <a:spcPct val="107000"/>
+                        </a:lnSpc>
+                        <a:spcBef>
+                          <a:spcPts val="0"/>
+                        </a:spcBef>
+                        <a:spcAft>
+                          <a:spcPts val="800"/>
+                        </a:spcAft>
+                      </a:pPr>
+                      <a:r>
+                        <a:rPr lang="en-US" sz="1600">
+                          <a:effectLst/>
+                        </a:rPr>
+                        <a:t>Tuesday</a:t>
+                      </a:r>
+                      <a:endParaRPr lang="en-US" sz="1600">
+                        <a:effectLst/>
+                        <a:latin typeface="Calibri" panose="020F0502020204030204" pitchFamily="34" charset="0"/>
+                        <a:ea typeface="Calibri" panose="020F0502020204030204" pitchFamily="34" charset="0"/>
+                        <a:cs typeface="Times New Roman" panose="02020603050405020304" pitchFamily="18" charset="0"/>
+                      </a:endParaRPr>
+                    </a:p>
+                  </a:txBody>
+                  <a:tcPr marL="15875" marR="15875" marT="15875" marB="15875" anchor="ctr">
+                    <a:lnL w="12700" cap="flat" cmpd="sng" algn="ctr">
+                      <a:solidFill>
+                        <a:schemeClr val="tx1"/>
+                      </a:solidFill>
+                      <a:prstDash val="solid"/>
+                      <a:round/>
+                      <a:headEnd type="none" w="med" len="med"/>
+                      <a:tailEnd type="none" w="med" len="med"/>
+                    </a:lnL>
+                    <a:lnR w="12700" cap="flat" cmpd="sng" algn="ctr">
+                      <a:solidFill>
+                        <a:schemeClr val="tx1"/>
+                      </a:solidFill>
+                      <a:prstDash val="solid"/>
+                      <a:round/>
+                      <a:headEnd type="none" w="med" len="med"/>
+                      <a:tailEnd type="none" w="med" len="med"/>
+                    </a:lnR>
+                    <a:lnT w="12700" cap="flat" cmpd="sng" algn="ctr">
+                      <a:solidFill>
+                        <a:schemeClr val="tx1"/>
+                      </a:solidFill>
+                      <a:prstDash val="solid"/>
+                      <a:round/>
+                      <a:headEnd type="none" w="med" len="med"/>
+                      <a:tailEnd type="none" w="med" len="med"/>
+                    </a:lnT>
+                    <a:lnB w="12700" cap="flat" cmpd="sng" algn="ctr">
+                      <a:solidFill>
+                        <a:schemeClr val="tx1"/>
+                      </a:solidFill>
+                      <a:prstDash val="solid"/>
+                      <a:round/>
+                      <a:headEnd type="none" w="med" len="med"/>
+                      <a:tailEnd type="none" w="med" len="med"/>
+                    </a:lnB>
+                    <a:lnTlToBr w="12700" cmpd="sng">
+                      <a:noFill/>
+                      <a:prstDash val="solid"/>
+                    </a:lnTlToBr>
+                    <a:lnBlToTr w="12700" cmpd="sng">
+                      <a:noFill/>
+                      <a:prstDash val="solid"/>
+                    </a:lnBlToTr>
+                    <a:solidFill>
+                      <a:schemeClr val="bg1"/>
+                    </a:solidFill>
+                  </a:tcPr>
+                </a:tc>
+                <a:tc>
+                  <a:txBody>
+                    <a:bodyPr/>
+                    <a:lstStyle/>
+                    <a:p>
+                      <a:pPr marL="0" marR="0">
+                        <a:lnSpc>
+                          <a:spcPct val="107000"/>
+                        </a:lnSpc>
+                        <a:spcBef>
+                          <a:spcPts val="0"/>
+                        </a:spcBef>
+                        <a:spcAft>
+                          <a:spcPts val="800"/>
+                        </a:spcAft>
+                      </a:pPr>
+                      <a:r>
+                        <a:rPr lang="en-US" sz="1600">
+                          <a:effectLst/>
+                        </a:rPr>
+                        <a:t>6 PM - 8 PM : Teams</a:t>
+                      </a:r>
+                      <a:endParaRPr lang="en-US" sz="1600">
+                        <a:effectLst/>
+                        <a:latin typeface="Calibri" panose="020F0502020204030204" pitchFamily="34" charset="0"/>
+                        <a:ea typeface="Calibri" panose="020F0502020204030204" pitchFamily="34" charset="0"/>
+                        <a:cs typeface="Times New Roman" panose="02020603050405020304" pitchFamily="18" charset="0"/>
+                      </a:endParaRPr>
+                    </a:p>
+                  </a:txBody>
+                  <a:tcPr marL="15875" marR="15875" marT="15875" marB="15875" anchor="ctr">
+                    <a:lnL w="12700" cap="flat" cmpd="sng" algn="ctr">
+                      <a:solidFill>
+                        <a:schemeClr val="tx1"/>
+                      </a:solidFill>
+                      <a:prstDash val="solid"/>
+                      <a:round/>
+                      <a:headEnd type="none" w="med" len="med"/>
+                      <a:tailEnd type="none" w="med" len="med"/>
+                    </a:lnL>
+                    <a:lnR w="12700" cap="flat" cmpd="sng" algn="ctr">
+                      <a:solidFill>
+                        <a:schemeClr val="tx1"/>
+                      </a:solidFill>
+                      <a:prstDash val="solid"/>
+                      <a:round/>
+                      <a:headEnd type="none" w="med" len="med"/>
+                      <a:tailEnd type="none" w="med" len="med"/>
+                    </a:lnR>
+                    <a:lnT w="12700" cap="flat" cmpd="sng" algn="ctr">
+                      <a:solidFill>
+                        <a:schemeClr val="tx1"/>
+                      </a:solidFill>
+                      <a:prstDash val="solid"/>
+                      <a:round/>
+                      <a:headEnd type="none" w="med" len="med"/>
+                      <a:tailEnd type="none" w="med" len="med"/>
+                    </a:lnT>
+                    <a:lnB w="12700" cap="flat" cmpd="sng" algn="ctr">
+                      <a:solidFill>
+                        <a:schemeClr val="tx1"/>
+                      </a:solidFill>
+                      <a:prstDash val="solid"/>
+                      <a:round/>
+                      <a:headEnd type="none" w="med" len="med"/>
+                      <a:tailEnd type="none" w="med" len="med"/>
+                    </a:lnB>
+                    <a:lnTlToBr w="12700" cmpd="sng">
+                      <a:noFill/>
+                      <a:prstDash val="solid"/>
+                    </a:lnTlToBr>
+                    <a:lnBlToTr w="12700" cmpd="sng">
+                      <a:noFill/>
+                      <a:prstDash val="solid"/>
+                    </a:lnBlToTr>
+                    <a:solidFill>
+                      <a:schemeClr val="bg1"/>
+                    </a:solidFill>
+                  </a:tcPr>
+                </a:tc>
+                <a:extLst>
+                  <a:ext uri="{0D108BD9-81ED-4DB2-BD59-A6C34878D82A}">
+                    <a16:rowId xmlns:a16="http://schemas.microsoft.com/office/drawing/2014/main" val="1164388044"/>
+                  </a:ext>
+                </a:extLst>
+              </a:tr>
+              <a:tr h="581669">
+                <a:tc>
+                  <a:txBody>
+                    <a:bodyPr/>
+                    <a:lstStyle/>
+                    <a:p>
+                      <a:pPr marL="0" marR="0">
+                        <a:lnSpc>
+                          <a:spcPct val="107000"/>
+                        </a:lnSpc>
+                        <a:spcBef>
+                          <a:spcPts val="0"/>
+                        </a:spcBef>
+                        <a:spcAft>
+                          <a:spcPts val="800"/>
+                        </a:spcAft>
+                      </a:pPr>
+                      <a:r>
+                        <a:rPr lang="en-US" sz="1600">
+                          <a:effectLst/>
+                        </a:rPr>
+                        <a:t>Wednesday</a:t>
+                      </a:r>
+                      <a:endParaRPr lang="en-US" sz="1600">
+                        <a:effectLst/>
+                        <a:latin typeface="Calibri" panose="020F0502020204030204" pitchFamily="34" charset="0"/>
+                        <a:ea typeface="Calibri" panose="020F0502020204030204" pitchFamily="34" charset="0"/>
+                        <a:cs typeface="Times New Roman" panose="02020603050405020304" pitchFamily="18" charset="0"/>
+                      </a:endParaRPr>
+                    </a:p>
+                  </a:txBody>
+                  <a:tcPr marL="15875" marR="15875" marT="15875" marB="15875" anchor="ctr">
+                    <a:lnL w="12700" cap="flat" cmpd="sng" algn="ctr">
+                      <a:solidFill>
+                        <a:schemeClr val="tx1"/>
+                      </a:solidFill>
+                      <a:prstDash val="solid"/>
+                      <a:round/>
+                      <a:headEnd type="none" w="med" len="med"/>
+                      <a:tailEnd type="none" w="med" len="med"/>
+                    </a:lnL>
+                    <a:lnR w="12700" cap="flat" cmpd="sng" algn="ctr">
+                      <a:solidFill>
+                        <a:schemeClr val="tx1"/>
+                      </a:solidFill>
+                      <a:prstDash val="solid"/>
+                      <a:round/>
+                      <a:headEnd type="none" w="med" len="med"/>
+                      <a:tailEnd type="none" w="med" len="med"/>
+                    </a:lnR>
+                    <a:lnT w="12700" cap="flat" cmpd="sng" algn="ctr">
+                      <a:solidFill>
+                        <a:schemeClr val="tx1"/>
+                      </a:solidFill>
+                      <a:prstDash val="solid"/>
+                      <a:round/>
+                      <a:headEnd type="none" w="med" len="med"/>
+                      <a:tailEnd type="none" w="med" len="med"/>
+                    </a:lnT>
+                    <a:lnB w="12700" cap="flat" cmpd="sng" algn="ctr">
+                      <a:solidFill>
+                        <a:schemeClr val="tx1"/>
+                      </a:solidFill>
+                      <a:prstDash val="solid"/>
+                      <a:round/>
+                      <a:headEnd type="none" w="med" len="med"/>
+                      <a:tailEnd type="none" w="med" len="med"/>
+                    </a:lnB>
+                    <a:lnTlToBr w="12700" cmpd="sng">
+                      <a:noFill/>
+                      <a:prstDash val="solid"/>
+                    </a:lnTlToBr>
+                    <a:lnBlToTr w="12700" cmpd="sng">
+                      <a:noFill/>
+                      <a:prstDash val="solid"/>
+                    </a:lnBlToTr>
+                    <a:solidFill>
+                      <a:schemeClr val="bg1"/>
+                    </a:solidFill>
+                  </a:tcPr>
+                </a:tc>
+                <a:tc>
+                  <a:txBody>
+                    <a:bodyPr/>
+                    <a:lstStyle/>
+                    <a:p>
+                      <a:pPr marL="0" marR="0">
+                        <a:lnSpc>
+                          <a:spcPct val="107000"/>
+                        </a:lnSpc>
+                        <a:spcBef>
+                          <a:spcPts val="0"/>
+                        </a:spcBef>
+                        <a:spcAft>
+                          <a:spcPts val="800"/>
+                        </a:spcAft>
+                      </a:pPr>
+                      <a:r>
+                        <a:rPr lang="en-US" sz="1600">
+                          <a:effectLst/>
+                        </a:rPr>
+                        <a:t>3 PM - 5 PM : CSB 120</a:t>
+                      </a:r>
+                      <a:endParaRPr lang="en-US" sz="1600">
+                        <a:effectLst/>
+                        <a:latin typeface="Calibri" panose="020F0502020204030204" pitchFamily="34" charset="0"/>
+                        <a:ea typeface="Calibri" panose="020F0502020204030204" pitchFamily="34" charset="0"/>
+                        <a:cs typeface="Times New Roman" panose="02020603050405020304" pitchFamily="18" charset="0"/>
+                      </a:endParaRPr>
+                    </a:p>
+                  </a:txBody>
+                  <a:tcPr marL="15875" marR="15875" marT="15875" marB="15875" anchor="ctr">
+                    <a:lnL w="12700" cap="flat" cmpd="sng" algn="ctr">
+                      <a:solidFill>
+                        <a:schemeClr val="tx1"/>
+                      </a:solidFill>
+                      <a:prstDash val="solid"/>
+                      <a:round/>
+                      <a:headEnd type="none" w="med" len="med"/>
+                      <a:tailEnd type="none" w="med" len="med"/>
+                    </a:lnL>
+                    <a:lnR w="12700" cap="flat" cmpd="sng" algn="ctr">
+                      <a:solidFill>
+                        <a:schemeClr val="tx1"/>
+                      </a:solidFill>
+                      <a:prstDash val="solid"/>
+                      <a:round/>
+                      <a:headEnd type="none" w="med" len="med"/>
+                      <a:tailEnd type="none" w="med" len="med"/>
+                    </a:lnR>
+                    <a:lnT w="12700" cap="flat" cmpd="sng" algn="ctr">
+                      <a:solidFill>
+                        <a:schemeClr val="tx1"/>
+                      </a:solidFill>
+                      <a:prstDash val="solid"/>
+                      <a:round/>
+                      <a:headEnd type="none" w="med" len="med"/>
+                      <a:tailEnd type="none" w="med" len="med"/>
+                    </a:lnT>
+                    <a:lnB w="12700" cap="flat" cmpd="sng" algn="ctr">
+                      <a:solidFill>
+                        <a:schemeClr val="tx1"/>
+                      </a:solidFill>
+                      <a:prstDash val="solid"/>
+                      <a:round/>
+                      <a:headEnd type="none" w="med" len="med"/>
+                      <a:tailEnd type="none" w="med" len="med"/>
+                    </a:lnB>
+                    <a:lnTlToBr w="12700" cmpd="sng">
+                      <a:noFill/>
+                      <a:prstDash val="solid"/>
+                    </a:lnTlToBr>
+                    <a:lnBlToTr w="12700" cmpd="sng">
+                      <a:noFill/>
+                      <a:prstDash val="solid"/>
+                    </a:lnBlToTr>
+                    <a:solidFill>
+                      <a:schemeClr val="bg1"/>
+                    </a:solidFill>
+                  </a:tcPr>
+                </a:tc>
+                <a:extLst>
+                  <a:ext uri="{0D108BD9-81ED-4DB2-BD59-A6C34878D82A}">
+                    <a16:rowId xmlns:a16="http://schemas.microsoft.com/office/drawing/2014/main" val="1097778555"/>
+                  </a:ext>
+                </a:extLst>
+              </a:tr>
+              <a:tr h="307347">
+                <a:tc>
+                  <a:txBody>
+                    <a:bodyPr/>
+                    <a:lstStyle/>
+                    <a:p>
+                      <a:pPr marL="0" marR="0">
+                        <a:lnSpc>
+                          <a:spcPct val="107000"/>
+                        </a:lnSpc>
+                        <a:spcBef>
+                          <a:spcPts val="0"/>
+                        </a:spcBef>
+                        <a:spcAft>
+                          <a:spcPts val="800"/>
+                        </a:spcAft>
+                      </a:pPr>
+                      <a:r>
+                        <a:rPr lang="en-US" sz="1600">
+                          <a:effectLst/>
+                        </a:rPr>
+                        <a:t>Thursday</a:t>
+                      </a:r>
+                      <a:endParaRPr lang="en-US" sz="1600">
+                        <a:effectLst/>
+                        <a:latin typeface="Calibri" panose="020F0502020204030204" pitchFamily="34" charset="0"/>
+                        <a:ea typeface="Calibri" panose="020F0502020204030204" pitchFamily="34" charset="0"/>
+                        <a:cs typeface="Times New Roman" panose="02020603050405020304" pitchFamily="18" charset="0"/>
+                      </a:endParaRPr>
+                    </a:p>
+                  </a:txBody>
+                  <a:tcPr marL="15875" marR="15875" marT="15875" marB="15875" anchor="ctr">
+                    <a:lnL w="12700" cap="flat" cmpd="sng" algn="ctr">
+                      <a:solidFill>
+                        <a:schemeClr val="tx1"/>
+                      </a:solidFill>
+                      <a:prstDash val="solid"/>
+                      <a:round/>
+                      <a:headEnd type="none" w="med" len="med"/>
+                      <a:tailEnd type="none" w="med" len="med"/>
+                    </a:lnL>
+                    <a:lnR w="12700" cap="flat" cmpd="sng" algn="ctr">
+                      <a:solidFill>
+                        <a:schemeClr val="tx1"/>
+                      </a:solidFill>
+                      <a:prstDash val="solid"/>
+                      <a:round/>
+                      <a:headEnd type="none" w="med" len="med"/>
+                      <a:tailEnd type="none" w="med" len="med"/>
+                    </a:lnR>
+                    <a:lnT w="12700" cap="flat" cmpd="sng" algn="ctr">
+                      <a:solidFill>
+                        <a:schemeClr val="tx1"/>
+                      </a:solidFill>
+                      <a:prstDash val="solid"/>
+                      <a:round/>
+                      <a:headEnd type="none" w="med" len="med"/>
+                      <a:tailEnd type="none" w="med" len="med"/>
+                    </a:lnT>
+                    <a:lnB w="12700" cap="flat" cmpd="sng" algn="ctr">
+                      <a:solidFill>
+                        <a:schemeClr val="tx1"/>
+                      </a:solidFill>
+                      <a:prstDash val="solid"/>
+                      <a:round/>
+                      <a:headEnd type="none" w="med" len="med"/>
+                      <a:tailEnd type="none" w="med" len="med"/>
+                    </a:lnB>
+                    <a:lnTlToBr w="12700" cmpd="sng">
+                      <a:noFill/>
+                      <a:prstDash val="solid"/>
+                    </a:lnTlToBr>
+                    <a:lnBlToTr w="12700" cmpd="sng">
+                      <a:noFill/>
+                      <a:prstDash val="solid"/>
+                    </a:lnBlToTr>
+                    <a:solidFill>
+                      <a:schemeClr val="bg1"/>
+                    </a:solidFill>
+                  </a:tcPr>
+                </a:tc>
+                <a:tc>
+                  <a:txBody>
+                    <a:bodyPr/>
+                    <a:lstStyle/>
+                    <a:p>
+                      <a:pPr marL="0" marR="0">
+                        <a:lnSpc>
+                          <a:spcPct val="107000"/>
+                        </a:lnSpc>
+                        <a:spcBef>
+                          <a:spcPts val="0"/>
+                        </a:spcBef>
+                        <a:spcAft>
+                          <a:spcPts val="800"/>
+                        </a:spcAft>
+                      </a:pPr>
+                      <a:r>
+                        <a:rPr lang="en-US" sz="1600">
+                          <a:effectLst/>
+                        </a:rPr>
+                        <a:t>6 PM - 8 PM : Teams</a:t>
+                      </a:r>
+                      <a:endParaRPr lang="en-US" sz="1600">
+                        <a:effectLst/>
+                        <a:latin typeface="Calibri" panose="020F0502020204030204" pitchFamily="34" charset="0"/>
+                        <a:ea typeface="Calibri" panose="020F0502020204030204" pitchFamily="34" charset="0"/>
+                        <a:cs typeface="Times New Roman" panose="02020603050405020304" pitchFamily="18" charset="0"/>
+                      </a:endParaRPr>
+                    </a:p>
+                  </a:txBody>
+                  <a:tcPr marL="15875" marR="15875" marT="15875" marB="15875" anchor="ctr">
+                    <a:lnL w="12700" cap="flat" cmpd="sng" algn="ctr">
+                      <a:solidFill>
+                        <a:schemeClr val="tx1"/>
+                      </a:solidFill>
+                      <a:prstDash val="solid"/>
+                      <a:round/>
+                      <a:headEnd type="none" w="med" len="med"/>
+                      <a:tailEnd type="none" w="med" len="med"/>
+                    </a:lnL>
+                    <a:lnR w="12700" cap="flat" cmpd="sng" algn="ctr">
+                      <a:solidFill>
+                        <a:schemeClr val="tx1"/>
+                      </a:solidFill>
+                      <a:prstDash val="solid"/>
+                      <a:round/>
+                      <a:headEnd type="none" w="med" len="med"/>
+                      <a:tailEnd type="none" w="med" len="med"/>
+                    </a:lnR>
+                    <a:lnT w="12700" cap="flat" cmpd="sng" algn="ctr">
+                      <a:solidFill>
+                        <a:schemeClr val="tx1"/>
+                      </a:solidFill>
+                      <a:prstDash val="solid"/>
+                      <a:round/>
+                      <a:headEnd type="none" w="med" len="med"/>
+                      <a:tailEnd type="none" w="med" len="med"/>
+                    </a:lnT>
+                    <a:lnB w="12700" cap="flat" cmpd="sng" algn="ctr">
+                      <a:solidFill>
+                        <a:schemeClr val="tx1"/>
+                      </a:solidFill>
+                      <a:prstDash val="solid"/>
+                      <a:round/>
+                      <a:headEnd type="none" w="med" len="med"/>
+                      <a:tailEnd type="none" w="med" len="med"/>
+                    </a:lnB>
+                    <a:lnTlToBr w="12700" cmpd="sng">
+                      <a:noFill/>
+                      <a:prstDash val="solid"/>
+                    </a:lnTlToBr>
+                    <a:lnBlToTr w="12700" cmpd="sng">
+                      <a:noFill/>
+                      <a:prstDash val="solid"/>
+                    </a:lnBlToTr>
+                    <a:solidFill>
+                      <a:schemeClr val="bg1"/>
+                    </a:solidFill>
+                  </a:tcPr>
+                </a:tc>
+                <a:extLst>
+                  <a:ext uri="{0D108BD9-81ED-4DB2-BD59-A6C34878D82A}">
+                    <a16:rowId xmlns:a16="http://schemas.microsoft.com/office/drawing/2014/main" val="1747960062"/>
+                  </a:ext>
+                </a:extLst>
+              </a:tr>
+              <a:tr h="581669">
+                <a:tc>
+                  <a:txBody>
+                    <a:bodyPr/>
+                    <a:lstStyle/>
+                    <a:p>
+                      <a:pPr marL="0" marR="0">
+                        <a:lnSpc>
+                          <a:spcPct val="107000"/>
+                        </a:lnSpc>
+                        <a:spcBef>
+                          <a:spcPts val="0"/>
+                        </a:spcBef>
+                        <a:spcAft>
+                          <a:spcPts val="800"/>
+                        </a:spcAft>
+                      </a:pPr>
+                      <a:r>
+                        <a:rPr lang="en-US" sz="1600">
+                          <a:effectLst/>
+                        </a:rPr>
+                        <a:t>Friday</a:t>
+                      </a:r>
+                      <a:endParaRPr lang="en-US" sz="1600">
+                        <a:effectLst/>
+                        <a:latin typeface="Calibri" panose="020F0502020204030204" pitchFamily="34" charset="0"/>
+                        <a:ea typeface="Calibri" panose="020F0502020204030204" pitchFamily="34" charset="0"/>
+                        <a:cs typeface="Times New Roman" panose="02020603050405020304" pitchFamily="18" charset="0"/>
+                      </a:endParaRPr>
+                    </a:p>
+                  </a:txBody>
+                  <a:tcPr marL="15875" marR="15875" marT="15875" marB="15875" anchor="ctr">
+                    <a:lnL w="12700" cap="flat" cmpd="sng" algn="ctr">
+                      <a:solidFill>
+                        <a:schemeClr val="tx1"/>
+                      </a:solidFill>
+                      <a:prstDash val="solid"/>
+                      <a:round/>
+                      <a:headEnd type="none" w="med" len="med"/>
+                      <a:tailEnd type="none" w="med" len="med"/>
+                    </a:lnL>
+                    <a:lnR w="12700" cap="flat" cmpd="sng" algn="ctr">
+                      <a:solidFill>
+                        <a:schemeClr val="tx1"/>
+                      </a:solidFill>
+                      <a:prstDash val="solid"/>
+                      <a:round/>
+                      <a:headEnd type="none" w="med" len="med"/>
+                      <a:tailEnd type="none" w="med" len="med"/>
+                    </a:lnR>
+                    <a:lnT w="12700" cap="flat" cmpd="sng" algn="ctr">
+                      <a:solidFill>
+                        <a:schemeClr val="tx1"/>
+                      </a:solidFill>
+                      <a:prstDash val="solid"/>
+                      <a:round/>
+                      <a:headEnd type="none" w="med" len="med"/>
+                      <a:tailEnd type="none" w="med" len="med"/>
+                    </a:lnT>
+                    <a:lnB w="12700" cap="flat" cmpd="sng" algn="ctr">
+                      <a:solidFill>
+                        <a:schemeClr val="tx1"/>
+                      </a:solidFill>
+                      <a:prstDash val="solid"/>
+                      <a:round/>
+                      <a:headEnd type="none" w="med" len="med"/>
+                      <a:tailEnd type="none" w="med" len="med"/>
+                    </a:lnB>
+                    <a:lnTlToBr w="12700" cmpd="sng">
+                      <a:noFill/>
+                      <a:prstDash val="solid"/>
+                    </a:lnTlToBr>
+                    <a:lnBlToTr w="12700" cmpd="sng">
+                      <a:noFill/>
+                      <a:prstDash val="solid"/>
+                    </a:lnBlToTr>
+                    <a:solidFill>
+                      <a:schemeClr val="bg1"/>
+                    </a:solidFill>
+                  </a:tcPr>
+                </a:tc>
+                <a:tc>
+                  <a:txBody>
+                    <a:bodyPr/>
+                    <a:lstStyle/>
+                    <a:p>
+                      <a:pPr marL="0" marR="0">
+                        <a:lnSpc>
+                          <a:spcPct val="107000"/>
+                        </a:lnSpc>
+                        <a:spcBef>
+                          <a:spcPts val="0"/>
+                        </a:spcBef>
+                        <a:spcAft>
+                          <a:spcPts val="800"/>
+                        </a:spcAft>
+                      </a:pPr>
+                      <a:r>
+                        <a:rPr lang="en-US" sz="1600">
+                          <a:effectLst/>
+                        </a:rPr>
+                        <a:t>3 PM - 5 PM : CSB 120</a:t>
+                      </a:r>
+                      <a:endParaRPr lang="en-US" sz="1600">
+                        <a:effectLst/>
+                        <a:latin typeface="Calibri" panose="020F0502020204030204" pitchFamily="34" charset="0"/>
+                        <a:ea typeface="Calibri" panose="020F0502020204030204" pitchFamily="34" charset="0"/>
+                        <a:cs typeface="Times New Roman" panose="02020603050405020304" pitchFamily="18" charset="0"/>
+                      </a:endParaRPr>
+                    </a:p>
+                  </a:txBody>
+                  <a:tcPr marL="15875" marR="15875" marT="15875" marB="15875" anchor="ctr">
+                    <a:lnL w="12700" cap="flat" cmpd="sng" algn="ctr">
+                      <a:solidFill>
+                        <a:schemeClr val="tx1"/>
+                      </a:solidFill>
+                      <a:prstDash val="solid"/>
+                      <a:round/>
+                      <a:headEnd type="none" w="med" len="med"/>
+                      <a:tailEnd type="none" w="med" len="med"/>
+                    </a:lnL>
+                    <a:lnR w="12700" cap="flat" cmpd="sng" algn="ctr">
+                      <a:solidFill>
+                        <a:schemeClr val="tx1"/>
+                      </a:solidFill>
+                      <a:prstDash val="solid"/>
+                      <a:round/>
+                      <a:headEnd type="none" w="med" len="med"/>
+                      <a:tailEnd type="none" w="med" len="med"/>
+                    </a:lnR>
+                    <a:lnT w="12700" cap="flat" cmpd="sng" algn="ctr">
+                      <a:solidFill>
+                        <a:schemeClr val="tx1"/>
+                      </a:solidFill>
+                      <a:prstDash val="solid"/>
+                      <a:round/>
+                      <a:headEnd type="none" w="med" len="med"/>
+                      <a:tailEnd type="none" w="med" len="med"/>
+                    </a:lnT>
+                    <a:lnB w="12700" cap="flat" cmpd="sng" algn="ctr">
+                      <a:solidFill>
+                        <a:schemeClr val="tx1"/>
+                      </a:solidFill>
+                      <a:prstDash val="solid"/>
+                      <a:round/>
+                      <a:headEnd type="none" w="med" len="med"/>
+                      <a:tailEnd type="none" w="med" len="med"/>
+                    </a:lnB>
+                    <a:lnTlToBr w="12700" cmpd="sng">
+                      <a:noFill/>
+                      <a:prstDash val="solid"/>
+                    </a:lnTlToBr>
+                    <a:lnBlToTr w="12700" cmpd="sng">
+                      <a:noFill/>
+                      <a:prstDash val="solid"/>
+                    </a:lnBlToTr>
+                    <a:solidFill>
+                      <a:schemeClr val="bg1"/>
+                    </a:solidFill>
+                  </a:tcPr>
+                </a:tc>
+                <a:extLst>
+                  <a:ext uri="{0D108BD9-81ED-4DB2-BD59-A6C34878D82A}">
+                    <a16:rowId xmlns:a16="http://schemas.microsoft.com/office/drawing/2014/main" val="1553865624"/>
+                  </a:ext>
+                </a:extLst>
+              </a:tr>
+              <a:tr h="307347">
+                <a:tc>
+                  <a:txBody>
+                    <a:bodyPr/>
+                    <a:lstStyle/>
+                    <a:p>
+                      <a:pPr marL="0" marR="0">
+                        <a:lnSpc>
+                          <a:spcPct val="107000"/>
+                        </a:lnSpc>
+                        <a:spcBef>
+                          <a:spcPts val="0"/>
+                        </a:spcBef>
+                        <a:spcAft>
+                          <a:spcPts val="800"/>
+                        </a:spcAft>
+                      </a:pPr>
+                      <a:r>
+                        <a:rPr lang="en-US" sz="1600">
+                          <a:effectLst/>
+                        </a:rPr>
+                        <a:t>Saturday</a:t>
+                      </a:r>
+                      <a:endParaRPr lang="en-US" sz="1600">
+                        <a:effectLst/>
+                        <a:latin typeface="Calibri" panose="020F0502020204030204" pitchFamily="34" charset="0"/>
+                        <a:ea typeface="Calibri" panose="020F0502020204030204" pitchFamily="34" charset="0"/>
+                        <a:cs typeface="Times New Roman" panose="02020603050405020304" pitchFamily="18" charset="0"/>
+                      </a:endParaRPr>
+                    </a:p>
+                  </a:txBody>
+                  <a:tcPr marL="15875" marR="15875" marT="15875" marB="15875" anchor="ctr">
+                    <a:lnL w="12700" cap="flat" cmpd="sng" algn="ctr">
+                      <a:solidFill>
+                        <a:schemeClr val="tx1"/>
+                      </a:solidFill>
+                      <a:prstDash val="solid"/>
+                      <a:round/>
+                      <a:headEnd type="none" w="med" len="med"/>
+                      <a:tailEnd type="none" w="med" len="med"/>
+                    </a:lnL>
+                    <a:lnR w="12700" cap="flat" cmpd="sng" algn="ctr">
+                      <a:solidFill>
+                        <a:schemeClr val="tx1"/>
+                      </a:solidFill>
+                      <a:prstDash val="solid"/>
+                      <a:round/>
+                      <a:headEnd type="none" w="med" len="med"/>
+                      <a:tailEnd type="none" w="med" len="med"/>
+                    </a:lnR>
+                    <a:lnT w="12700" cap="flat" cmpd="sng" algn="ctr">
+                      <a:solidFill>
+                        <a:schemeClr val="tx1"/>
+                      </a:solidFill>
+                      <a:prstDash val="solid"/>
+                      <a:round/>
+                      <a:headEnd type="none" w="med" len="med"/>
+                      <a:tailEnd type="none" w="med" len="med"/>
+                    </a:lnT>
+                    <a:lnB w="12700" cap="flat" cmpd="sng" algn="ctr">
+                      <a:solidFill>
+                        <a:schemeClr val="tx1"/>
+                      </a:solidFill>
+                      <a:prstDash val="solid"/>
+                      <a:round/>
+                      <a:headEnd type="none" w="med" len="med"/>
+                      <a:tailEnd type="none" w="med" len="med"/>
+                    </a:lnB>
+                    <a:lnTlToBr w="12700" cmpd="sng">
+                      <a:noFill/>
+                      <a:prstDash val="solid"/>
+                    </a:lnTlToBr>
+                    <a:lnBlToTr w="12700" cmpd="sng">
+                      <a:noFill/>
+                      <a:prstDash val="solid"/>
+                    </a:lnBlToTr>
+                    <a:solidFill>
+                      <a:schemeClr val="bg1"/>
+                    </a:solidFill>
+                  </a:tcPr>
+                </a:tc>
+                <a:tc>
+                  <a:txBody>
+                    <a:bodyPr/>
+                    <a:lstStyle/>
+                    <a:p>
+                      <a:pPr marL="0" marR="0">
+                        <a:lnSpc>
+                          <a:spcPct val="107000"/>
+                        </a:lnSpc>
+                        <a:spcBef>
+                          <a:spcPts val="0"/>
+                        </a:spcBef>
+                        <a:spcAft>
+                          <a:spcPts val="800"/>
+                        </a:spcAft>
+                      </a:pPr>
+                      <a:r>
+                        <a:rPr lang="en-US" sz="1600" dirty="0">
+                          <a:effectLst/>
+                        </a:rPr>
+                        <a:t>12 PM - 4 PM : Teams</a:t>
+                      </a:r>
+                      <a:endParaRPr lang="en-US" sz="1600" dirty="0">
+                        <a:effectLst/>
+                        <a:latin typeface="Calibri" panose="020F0502020204030204" pitchFamily="34" charset="0"/>
+                        <a:ea typeface="Calibri" panose="020F0502020204030204" pitchFamily="34" charset="0"/>
+                        <a:cs typeface="Times New Roman" panose="02020603050405020304" pitchFamily="18" charset="0"/>
+                      </a:endParaRPr>
+                    </a:p>
+                  </a:txBody>
+                  <a:tcPr marL="15875" marR="15875" marT="15875" marB="15875" anchor="ctr">
+                    <a:lnL w="12700" cap="flat" cmpd="sng" algn="ctr">
+                      <a:solidFill>
+                        <a:schemeClr val="tx1"/>
+                      </a:solidFill>
+                      <a:prstDash val="solid"/>
+                      <a:round/>
+                      <a:headEnd type="none" w="med" len="med"/>
+                      <a:tailEnd type="none" w="med" len="med"/>
+                    </a:lnL>
+                    <a:lnR w="12700" cap="flat" cmpd="sng" algn="ctr">
+                      <a:solidFill>
+                        <a:schemeClr val="tx1"/>
+                      </a:solidFill>
+                      <a:prstDash val="solid"/>
+                      <a:round/>
+                      <a:headEnd type="none" w="med" len="med"/>
+                      <a:tailEnd type="none" w="med" len="med"/>
+                    </a:lnR>
+                    <a:lnT w="12700" cap="flat" cmpd="sng" algn="ctr">
+                      <a:solidFill>
+                        <a:schemeClr val="tx1"/>
+                      </a:solidFill>
+                      <a:prstDash val="solid"/>
+                      <a:round/>
+                      <a:headEnd type="none" w="med" len="med"/>
+                      <a:tailEnd type="none" w="med" len="med"/>
+                    </a:lnT>
+                    <a:lnB w="12700" cap="flat" cmpd="sng" algn="ctr">
+                      <a:solidFill>
+                        <a:schemeClr val="tx1"/>
+                      </a:solidFill>
+                      <a:prstDash val="solid"/>
+                      <a:round/>
+                      <a:headEnd type="none" w="med" len="med"/>
+                      <a:tailEnd type="none" w="med" len="med"/>
+                    </a:lnB>
+                    <a:lnTlToBr w="12700" cmpd="sng">
+                      <a:noFill/>
+                      <a:prstDash val="solid"/>
+                    </a:lnTlToBr>
+                    <a:lnBlToTr w="12700" cmpd="sng">
+                      <a:noFill/>
+                      <a:prstDash val="solid"/>
+                    </a:lnBlToTr>
+                    <a:solidFill>
+                      <a:schemeClr val="bg1"/>
+                    </a:solidFill>
+                  </a:tcPr>
+                </a:tc>
+                <a:extLst>
+                  <a:ext uri="{0D108BD9-81ED-4DB2-BD59-A6C34878D82A}">
+                    <a16:rowId xmlns:a16="http://schemas.microsoft.com/office/drawing/2014/main" val="3921746368"/>
+                  </a:ext>
+                </a:extLst>
+              </a:tr>
+              <a:tr h="307347">
+                <a:tc>
+                  <a:txBody>
+                    <a:bodyPr/>
+                    <a:lstStyle/>
+                    <a:p>
+                      <a:pPr marL="0" marR="0">
+                        <a:lnSpc>
+                          <a:spcPct val="107000"/>
+                        </a:lnSpc>
+                        <a:spcBef>
+                          <a:spcPts val="0"/>
+                        </a:spcBef>
+                        <a:spcAft>
+                          <a:spcPts val="800"/>
+                        </a:spcAft>
+                      </a:pPr>
+                      <a:r>
+                        <a:rPr lang="en-US" sz="1600">
+                          <a:effectLst/>
+                        </a:rPr>
+                        <a:t>Sunday</a:t>
+                      </a:r>
+                      <a:endParaRPr lang="en-US" sz="1600">
+                        <a:effectLst/>
+                        <a:latin typeface="Calibri" panose="020F0502020204030204" pitchFamily="34" charset="0"/>
+                        <a:ea typeface="Calibri" panose="020F0502020204030204" pitchFamily="34" charset="0"/>
+                        <a:cs typeface="Times New Roman" panose="02020603050405020304" pitchFamily="18" charset="0"/>
+                      </a:endParaRPr>
+                    </a:p>
+                  </a:txBody>
+                  <a:tcPr marL="15875" marR="15875" marT="15875" marB="15875" anchor="ctr">
+                    <a:lnL w="12700" cap="flat" cmpd="sng" algn="ctr">
+                      <a:solidFill>
+                        <a:schemeClr val="tx1"/>
+                      </a:solidFill>
+                      <a:prstDash val="solid"/>
+                      <a:round/>
+                      <a:headEnd type="none" w="med" len="med"/>
+                      <a:tailEnd type="none" w="med" len="med"/>
+                    </a:lnL>
+                    <a:lnR w="12700" cap="flat" cmpd="sng" algn="ctr">
+                      <a:solidFill>
+                        <a:schemeClr val="tx1"/>
+                      </a:solidFill>
+                      <a:prstDash val="solid"/>
+                      <a:round/>
+                      <a:headEnd type="none" w="med" len="med"/>
+                      <a:tailEnd type="none" w="med" len="med"/>
+                    </a:lnR>
+                    <a:lnT w="12700" cap="flat" cmpd="sng" algn="ctr">
+                      <a:solidFill>
+                        <a:schemeClr val="tx1"/>
+                      </a:solidFill>
+                      <a:prstDash val="solid"/>
+                      <a:round/>
+                      <a:headEnd type="none" w="med" len="med"/>
+                      <a:tailEnd type="none" w="med" len="med"/>
+                    </a:lnT>
+                    <a:lnB w="12700" cap="flat" cmpd="sng" algn="ctr">
+                      <a:solidFill>
+                        <a:schemeClr val="tx1"/>
+                      </a:solidFill>
+                      <a:prstDash val="solid"/>
+                      <a:round/>
+                      <a:headEnd type="none" w="med" len="med"/>
+                      <a:tailEnd type="none" w="med" len="med"/>
+                    </a:lnB>
+                    <a:lnTlToBr w="12700" cmpd="sng">
+                      <a:noFill/>
+                      <a:prstDash val="solid"/>
+                    </a:lnTlToBr>
+                    <a:lnBlToTr w="12700" cmpd="sng">
+                      <a:noFill/>
+                      <a:prstDash val="solid"/>
+                    </a:lnBlToTr>
+                    <a:solidFill>
+                      <a:schemeClr val="bg1"/>
+                    </a:solidFill>
+                  </a:tcPr>
+                </a:tc>
+                <a:tc>
+                  <a:txBody>
+                    <a:bodyPr/>
+                    <a:lstStyle/>
+                    <a:p>
+                      <a:pPr marL="0" marR="0">
+                        <a:lnSpc>
+                          <a:spcPct val="107000"/>
+                        </a:lnSpc>
+                        <a:spcBef>
+                          <a:spcPts val="0"/>
+                        </a:spcBef>
+                        <a:spcAft>
+                          <a:spcPts val="800"/>
+                        </a:spcAft>
+                      </a:pPr>
+                      <a:r>
+                        <a:rPr lang="en-US" sz="1600" dirty="0">
+                          <a:effectLst/>
+                        </a:rPr>
+                        <a:t>12 PM - 4 PM : Teams</a:t>
+                      </a:r>
+                      <a:endParaRPr lang="en-US" sz="1600" dirty="0">
+                        <a:effectLst/>
+                        <a:latin typeface="Calibri" panose="020F0502020204030204" pitchFamily="34" charset="0"/>
+                        <a:ea typeface="Calibri" panose="020F0502020204030204" pitchFamily="34" charset="0"/>
+                        <a:cs typeface="Times New Roman" panose="02020603050405020304" pitchFamily="18" charset="0"/>
+                      </a:endParaRPr>
+                    </a:p>
+                  </a:txBody>
+                  <a:tcPr marL="15875" marR="15875" marT="15875" marB="15875" anchor="ctr">
+                    <a:lnL w="12700" cap="flat" cmpd="sng" algn="ctr">
+                      <a:solidFill>
+                        <a:schemeClr val="tx1"/>
+                      </a:solidFill>
+                      <a:prstDash val="solid"/>
+                      <a:round/>
+                      <a:headEnd type="none" w="med" len="med"/>
+                      <a:tailEnd type="none" w="med" len="med"/>
+                    </a:lnL>
+                    <a:lnR w="12700" cap="flat" cmpd="sng" algn="ctr">
+                      <a:solidFill>
+                        <a:schemeClr val="tx1"/>
+                      </a:solidFill>
+                      <a:prstDash val="solid"/>
+                      <a:round/>
+                      <a:headEnd type="none" w="med" len="med"/>
+                      <a:tailEnd type="none" w="med" len="med"/>
+                    </a:lnR>
+                    <a:lnT w="12700" cap="flat" cmpd="sng" algn="ctr">
+                      <a:solidFill>
+                        <a:schemeClr val="tx1"/>
+                      </a:solidFill>
+                      <a:prstDash val="solid"/>
+                      <a:round/>
+                      <a:headEnd type="none" w="med" len="med"/>
+                      <a:tailEnd type="none" w="med" len="med"/>
+                    </a:lnT>
+                    <a:lnB w="12700" cap="flat" cmpd="sng" algn="ctr">
+                      <a:solidFill>
+                        <a:schemeClr val="tx1"/>
+                      </a:solidFill>
+                      <a:prstDash val="solid"/>
+                      <a:round/>
+                      <a:headEnd type="none" w="med" len="med"/>
+                      <a:tailEnd type="none" w="med" len="med"/>
+                    </a:lnB>
+                    <a:lnTlToBr w="12700" cmpd="sng">
+                      <a:noFill/>
+                      <a:prstDash val="solid"/>
+                    </a:lnTlToBr>
+                    <a:lnBlToTr w="12700" cmpd="sng">
+                      <a:noFill/>
+                      <a:prstDash val="solid"/>
+                    </a:lnBlToTr>
+                    <a:solidFill>
+                      <a:schemeClr val="bg1"/>
+                    </a:solidFill>
+                  </a:tcPr>
+                </a:tc>
+                <a:extLst>
+                  <a:ext uri="{0D108BD9-81ED-4DB2-BD59-A6C34878D82A}">
+                    <a16:rowId xmlns:a16="http://schemas.microsoft.com/office/drawing/2014/main" val="1928039740"/>
+                  </a:ext>
+                </a:extLst>
+              </a:tr>
+            </a:tbl>
+          </a:graphicData>
+        </a:graphic>
+      </p:graphicFrame>
     </p:spTree>
     <p:extLst>
       <p:ext uri="{BB962C8B-B14F-4D97-AF65-F5344CB8AC3E}">
@@ -18515,7 +19039,7 @@
             </a:solidFill>
             <a:extLst>
               <a:ext uri="{C807C97D-BFC1-408E-A445-0C87EB9F89A2}">
-                <ask:lineSketchStyleProps xmlns:ask="http://schemas.microsoft.com/office/drawing/2018/sketchyshapes" xmlns="" sd="1219033472">
+                <ask:lineSketchStyleProps xmlns="" xmlns:ask="http://schemas.microsoft.com/office/drawing/2018/sketchyshapes" sd="1219033472">
                   <a:prstGeom prst="donut">
                     <a:avLst>
                       <a:gd name="adj" fmla="val 7120"/>
@@ -23053,7 +23577,7 @@
             </a:solidFill>
             <a:extLst>
               <a:ext uri="{C807C97D-BFC1-408E-A445-0C87EB9F89A2}">
-                <ask:lineSketchStyleProps xmlns:ask="http://schemas.microsoft.com/office/drawing/2018/sketchyshapes" xmlns="" sd="1219033472">
+                <ask:lineSketchStyleProps xmlns="" xmlns:ask="http://schemas.microsoft.com/office/drawing/2018/sketchyshapes" sd="1219033472">
                   <a:prstGeom prst="donut">
                     <a:avLst>
                       <a:gd name="adj" fmla="val 7120"/>
@@ -29445,14 +29969,6 @@
 </file>
 
 <file path=customXml/item1.xml><?xml version="1.0" encoding="utf-8"?>
-<p:properties xmlns:p="http://schemas.microsoft.com/office/2006/metadata/properties" xmlns:xsi="http://www.w3.org/2001/XMLSchema-instance" xmlns:pc="http://schemas.microsoft.com/office/infopath/2007/PartnerControls">
-  <documentManagement>
-    <_activity xmlns="92c41bee-f0ee-4aa6-9399-a35fbb883510" xsi:nil="true"/>
-  </documentManagement>
-</p:properties>
-</file>
-
-<file path=customXml/item2.xml><?xml version="1.0" encoding="utf-8"?>
 <ct:contentTypeSchema xmlns:ct="http://schemas.microsoft.com/office/2006/metadata/contentType" xmlns:ma="http://schemas.microsoft.com/office/2006/metadata/properties/metaAttributes" ct:_="" ma:_="" ma:contentTypeName="Document" ma:contentTypeID="0x010100074387D78AC76C4289401EF66FB51FCC" ma:contentTypeVersion="15" ma:contentTypeDescription="Create a new document." ma:contentTypeScope="" ma:versionID="d3659bec8b8330148a03d82a9d99f412">
   <xsd:schema xmlns:xsd="http://www.w3.org/2001/XMLSchema" xmlns:xs="http://www.w3.org/2001/XMLSchema" xmlns:p="http://schemas.microsoft.com/office/2006/metadata/properties" xmlns:ns3="92c41bee-f0ee-4aa6-9399-a35fbb883510" xmlns:ns4="e06ed288-fd75-4b50-bbed-f5a5df88c31c" targetNamespace="http://schemas.microsoft.com/office/2006/metadata/properties" ma:root="true" ma:fieldsID="1a21d371127b63848c9a2290f5945250" ns3:_="" ns4:_="">
     <xsd:import namespace="92c41bee-f0ee-4aa6-9399-a35fbb883510"/>
@@ -29687,6 +30203,14 @@
 </ct:contentTypeSchema>
 </file>
 
+<file path=customXml/item2.xml><?xml version="1.0" encoding="utf-8"?>
+<p:properties xmlns:p="http://schemas.microsoft.com/office/2006/metadata/properties" xmlns:xsi="http://www.w3.org/2001/XMLSchema-instance" xmlns:pc="http://schemas.microsoft.com/office/infopath/2007/PartnerControls">
+  <documentManagement>
+    <_activity xmlns="92c41bee-f0ee-4aa6-9399-a35fbb883510" xsi:nil="true"/>
+  </documentManagement>
+</p:properties>
+</file>
+
 <file path=customXml/item3.xml><?xml version="1.0" encoding="utf-8"?>
 <?mso-contentType ?>
 <FormTemplates xmlns="http://schemas.microsoft.com/sharepoint/v3/contenttype/forms">
@@ -29697,23 +30221,6 @@
 </file>
 
 <file path=customXml/itemProps1.xml><?xml version="1.0" encoding="utf-8"?>
-<ds:datastoreItem xmlns:ds="http://schemas.openxmlformats.org/officeDocument/2006/customXml" ds:itemID="{D8EDA486-473A-4896-BF03-20A328BFB43D}">
-  <ds:schemaRefs>
-    <ds:schemaRef ds:uri="http://schemas.microsoft.com/office/infopath/2007/PartnerControls"/>
-    <ds:schemaRef ds:uri="http://schemas.microsoft.com/office/2006/documentManagement/types"/>
-    <ds:schemaRef ds:uri="http://schemas.microsoft.com/office/2006/metadata/properties"/>
-    <ds:schemaRef ds:uri="http://www.w3.org/XML/1998/namespace"/>
-    <ds:schemaRef ds:uri="http://purl.org/dc/dcmitype/"/>
-    <ds:schemaRef ds:uri="e06ed288-fd75-4b50-bbed-f5a5df88c31c"/>
-    <ds:schemaRef ds:uri="http://purl.org/dc/elements/1.1/"/>
-    <ds:schemaRef ds:uri="http://schemas.openxmlformats.org/package/2006/metadata/core-properties"/>
-    <ds:schemaRef ds:uri="92c41bee-f0ee-4aa6-9399-a35fbb883510"/>
-    <ds:schemaRef ds:uri="http://purl.org/dc/terms/"/>
-  </ds:schemaRefs>
-</ds:datastoreItem>
-</file>
-
-<file path=customXml/itemProps2.xml><?xml version="1.0" encoding="utf-8"?>
 <ds:datastoreItem xmlns:ds="http://schemas.openxmlformats.org/officeDocument/2006/customXml" ds:itemID="{2FA58583-C1CB-442E-B4B2-992305C2EF52}">
   <ds:schemaRefs>
     <ds:schemaRef ds:uri="http://schemas.microsoft.com/office/2006/metadata/contentType"/>
@@ -29732,6 +30239,23 @@
 </ds:datastoreItem>
 </file>
 
+<file path=customXml/itemProps2.xml><?xml version="1.0" encoding="utf-8"?>
+<ds:datastoreItem xmlns:ds="http://schemas.openxmlformats.org/officeDocument/2006/customXml" ds:itemID="{D8EDA486-473A-4896-BF03-20A328BFB43D}">
+  <ds:schemaRefs>
+    <ds:schemaRef ds:uri="http://www.w3.org/XML/1998/namespace"/>
+    <ds:schemaRef ds:uri="http://purl.org/dc/elements/1.1/"/>
+    <ds:schemaRef ds:uri="http://purl.org/dc/dcmitype/"/>
+    <ds:schemaRef ds:uri="http://schemas.microsoft.com/office/infopath/2007/PartnerControls"/>
+    <ds:schemaRef ds:uri="http://schemas.microsoft.com/office/2006/documentManagement/types"/>
+    <ds:schemaRef ds:uri="http://schemas.openxmlformats.org/package/2006/metadata/core-properties"/>
+    <ds:schemaRef ds:uri="e06ed288-fd75-4b50-bbed-f5a5df88c31c"/>
+    <ds:schemaRef ds:uri="92c41bee-f0ee-4aa6-9399-a35fbb883510"/>
+    <ds:schemaRef ds:uri="http://schemas.microsoft.com/office/2006/metadata/properties"/>
+    <ds:schemaRef ds:uri="http://purl.org/dc/terms/"/>
+  </ds:schemaRefs>
+</ds:datastoreItem>
+</file>
+
 <file path=customXml/itemProps3.xml><?xml version="1.0" encoding="utf-8"?>
 <ds:datastoreItem xmlns:ds="http://schemas.openxmlformats.org/officeDocument/2006/customXml" ds:itemID="{7D0AC095-0B39-45D2-8F35-EC4BFB49405E}">
   <ds:schemaRefs>

</xml_diff>

<commit_message>
Week 11 slides updated
</commit_message>
<xml_diff>
--- a/slides/On-Campus/11_01_IntrotoRecursion.pptx
+++ b/slides/On-Campus/11_01_IntrotoRecursion.pptx
@@ -149,62 +149,28 @@
   </pc:docChgLst>
   <pc:docChgLst>
     <pc:chgData name="Marcia Moraes" userId="c9c67e8a-58e2-4733-9a1c-5d44fec4775b" providerId="ADAL" clId="{CEFF854B-7319-457A-B517-E5AAFFCE5BDD}"/>
-    <pc:docChg chg="modSld">
-      <pc:chgData name="Marcia Moraes" userId="c9c67e8a-58e2-4733-9a1c-5d44fec4775b" providerId="ADAL" clId="{CEFF854B-7319-457A-B517-E5AAFFCE5BDD}" dt="2023-10-30T17:14:08.342" v="0" actId="6549"/>
-      <pc:docMkLst>
-        <pc:docMk/>
-      </pc:docMkLst>
-      <pc:sldChg chg="modSp">
-        <pc:chgData name="Marcia Moraes" userId="c9c67e8a-58e2-4733-9a1c-5d44fec4775b" providerId="ADAL" clId="{CEFF854B-7319-457A-B517-E5AAFFCE5BDD}" dt="2023-10-30T17:14:08.342" v="0" actId="6549"/>
-        <pc:sldMkLst>
-          <pc:docMk/>
-          <pc:sldMk cId="2571368551" sldId="272"/>
-        </pc:sldMkLst>
-        <pc:spChg chg="mod">
-          <ac:chgData name="Marcia Moraes" userId="c9c67e8a-58e2-4733-9a1c-5d44fec4775b" providerId="ADAL" clId="{CEFF854B-7319-457A-B517-E5AAFFCE5BDD}" dt="2023-10-30T17:14:08.342" v="0" actId="6549"/>
-          <ac:spMkLst>
-            <pc:docMk/>
-            <pc:sldMk cId="2571368551" sldId="272"/>
-            <ac:spMk id="11" creationId="{BDA0DBC1-29A7-4498-B9AA-9B174D0FEC3E}"/>
-          </ac:spMkLst>
-        </pc:spChg>
-      </pc:sldChg>
-    </pc:docChg>
   </pc:docChgLst>
   <pc:docChgLst>
     <pc:chgData name="Moraes,Marcia" userId="c9c67e8a-58e2-4733-9a1c-5d44fec4775b" providerId="ADAL" clId="{D46B2D66-2AB5-4621-97C6-245206718DFE}"/>
   </pc:docChgLst>
   <pc:docChgLst>
     <pc:chgData name="Moraes,Marcia" userId="c9c67e8a-58e2-4733-9a1c-5d44fec4775b" providerId="ADAL" clId="{CEFF854B-7319-457A-B517-E5AAFFCE5BDD}"/>
-    <pc:docChg chg="custSel modSld">
-      <pc:chgData name="Moraes,Marcia" userId="c9c67e8a-58e2-4733-9a1c-5d44fec4775b" providerId="ADAL" clId="{CEFF854B-7319-457A-B517-E5AAFFCE5BDD}" dt="2023-10-27T18:29:40.929" v="3" actId="1076"/>
+  </pc:docChgLst>
+  <pc:docChgLst>
+    <pc:chgData name="Marcia Moraes" userId="c9c67e8a-58e2-4733-9a1c-5d44fec4775b" providerId="ADAL" clId="{30680904-8E08-4648-A3EB-511CFF94E28F}"/>
+    <pc:docChg chg="modSld">
+      <pc:chgData name="Marcia Moraes" userId="c9c67e8a-58e2-4733-9a1c-5d44fec4775b" providerId="ADAL" clId="{30680904-8E08-4648-A3EB-511CFF94E28F}" dt="2024-03-07T20:15:49.139" v="2" actId="20577"/>
       <pc:docMkLst>
         <pc:docMk/>
       </pc:docMkLst>
-      <pc:sldChg chg="addSp delSp modSp">
-        <pc:chgData name="Moraes,Marcia" userId="c9c67e8a-58e2-4733-9a1c-5d44fec4775b" providerId="ADAL" clId="{CEFF854B-7319-457A-B517-E5AAFFCE5BDD}" dt="2023-10-27T18:29:40.929" v="3" actId="1076"/>
+      <pc:sldChg chg="modSp">
+        <pc:chgData name="Marcia Moraes" userId="c9c67e8a-58e2-4733-9a1c-5d44fec4775b" providerId="ADAL" clId="{30680904-8E08-4648-A3EB-511CFF94E28F}" dt="2024-03-07T20:15:49.139" v="2" actId="20577"/>
         <pc:sldMkLst>
           <pc:docMk/>
           <pc:sldMk cId="2571368551" sldId="272"/>
         </pc:sldMkLst>
-        <pc:spChg chg="del">
-          <ac:chgData name="Moraes,Marcia" userId="c9c67e8a-58e2-4733-9a1c-5d44fec4775b" providerId="ADAL" clId="{CEFF854B-7319-457A-B517-E5AAFFCE5BDD}" dt="2023-10-27T18:29:29.664" v="0" actId="478"/>
-          <ac:spMkLst>
-            <pc:docMk/>
-            <pc:sldMk cId="2571368551" sldId="272"/>
-            <ac:spMk id="5" creationId="{1E54CBCD-3447-4F03-970A-F1628F46BEF2}"/>
-          </ac:spMkLst>
-        </pc:spChg>
-        <pc:spChg chg="add mod">
-          <ac:chgData name="Moraes,Marcia" userId="c9c67e8a-58e2-4733-9a1c-5d44fec4775b" providerId="ADAL" clId="{CEFF854B-7319-457A-B517-E5AAFFCE5BDD}" dt="2023-10-27T18:29:40.929" v="3" actId="1076"/>
-          <ac:spMkLst>
-            <pc:docMk/>
-            <pc:sldMk cId="2571368551" sldId="272"/>
-            <ac:spMk id="8" creationId="{DFC26188-D9E5-4021-ABA1-46B7AC8382B4}"/>
-          </ac:spMkLst>
-        </pc:spChg>
-        <pc:graphicFrameChg chg="add">
-          <ac:chgData name="Moraes,Marcia" userId="c9c67e8a-58e2-4733-9a1c-5d44fec4775b" providerId="ADAL" clId="{CEFF854B-7319-457A-B517-E5AAFFCE5BDD}" dt="2023-10-27T18:29:31.726" v="1"/>
+        <pc:graphicFrameChg chg="modGraphic">
+          <ac:chgData name="Marcia Moraes" userId="c9c67e8a-58e2-4733-9a1c-5d44fec4775b" providerId="ADAL" clId="{30680904-8E08-4648-A3EB-511CFF94E28F}" dt="2024-03-07T20:15:49.139" v="2" actId="20577"/>
           <ac:graphicFrameMkLst>
             <pc:docMk/>
             <pc:sldMk cId="2571368551" sldId="272"/>
@@ -299,7 +265,7 @@
           <a:p>
             <a:fld id="{4D7E51A5-B478-1E40-8CBB-0DAA8831E99D}" type="datetimeFigureOut">
               <a:rPr lang="en-US" smtClean="0"/>
-              <a:t>10/30/2023</a:t>
+              <a:t>3/7/2024</a:t>
             </a:fld>
             <a:endParaRPr lang="en-US"/>
           </a:p>
@@ -464,7 +430,7 @@
           <a:p>
             <a:fld id="{D0ED587F-861E-6740-9643-E3DDAE89B8D6}" type="datetimeFigureOut">
               <a:rPr lang="en-US" smtClean="0"/>
-              <a:t>10/30/2023</a:t>
+              <a:t>3/7/2024</a:t>
             </a:fld>
             <a:endParaRPr lang="en-US"/>
           </a:p>
@@ -14424,7 +14390,7 @@
           <p:nvPr>
             <p:extLst>
               <p:ext uri="{D42A27DB-BD31-4B8C-83A1-F6EECF244321}">
-                <p14:modId xmlns:p14="http://schemas.microsoft.com/office/powerpoint/2010/main" val="638111064"/>
+                <p14:modId xmlns:p14="http://schemas.microsoft.com/office/powerpoint/2010/main" val="2192494508"/>
               </p:ext>
             </p:extLst>
           </p:nvPr>
@@ -14732,10 +14698,28 @@
                         </a:spcAft>
                       </a:pPr>
                       <a:r>
+                        <a:rPr lang="en-US" sz="1600">
+                          <a:effectLst/>
+                        </a:rPr>
+                        <a:t>2 </a:t>
+                      </a:r>
+                      <a:r>
                         <a:rPr lang="en-US" sz="1600" dirty="0">
                           <a:effectLst/>
                         </a:rPr>
-                        <a:t>12 PM - 2 PM : CSB 120</a:t>
+                        <a:t>PM </a:t>
+                      </a:r>
+                      <a:r>
+                        <a:rPr lang="en-US" sz="1600">
+                          <a:effectLst/>
+                        </a:rPr>
+                        <a:t>- 5 </a:t>
+                      </a:r>
+                      <a:r>
+                        <a:rPr lang="en-US" sz="1600" dirty="0">
+                          <a:effectLst/>
+                        </a:rPr>
+                        <a:t>PM : CSB 120</a:t>
                       </a:r>
                       <a:endParaRPr lang="en-US" sz="1600" dirty="0">
                         <a:effectLst/>
@@ -19042,7 +19026,7 @@
             </a:solidFill>
             <a:extLst>
               <a:ext uri="{C807C97D-BFC1-408E-A445-0C87EB9F89A2}">
-                <ask:lineSketchStyleProps xmlns:ask="http://schemas.microsoft.com/office/drawing/2018/sketchyshapes" xmlns="" sd="1219033472">
+                <ask:lineSketchStyleProps xmlns="" xmlns:ask="http://schemas.microsoft.com/office/drawing/2018/sketchyshapes" sd="1219033472">
                   <a:prstGeom prst="donut">
                     <a:avLst>
                       <a:gd name="adj" fmla="val 7120"/>
@@ -23580,7 +23564,7 @@
             </a:solidFill>
             <a:extLst>
               <a:ext uri="{C807C97D-BFC1-408E-A445-0C87EB9F89A2}">
-                <ask:lineSketchStyleProps xmlns:ask="http://schemas.microsoft.com/office/drawing/2018/sketchyshapes" xmlns="" sd="1219033472">
+                <ask:lineSketchStyleProps xmlns="" xmlns:ask="http://schemas.microsoft.com/office/drawing/2018/sketchyshapes" sd="1219033472">
                   <a:prstGeom prst="donut">
                     <a:avLst>
                       <a:gd name="adj" fmla="val 7120"/>
@@ -30207,20 +30191,20 @@
 </file>
 
 <file path=customXml/item2.xml><?xml version="1.0" encoding="utf-8"?>
+<p:properties xmlns:p="http://schemas.microsoft.com/office/2006/metadata/properties" xmlns:xsi="http://www.w3.org/2001/XMLSchema-instance" xmlns:pc="http://schemas.microsoft.com/office/infopath/2007/PartnerControls">
+  <documentManagement>
+    <_activity xmlns="92c41bee-f0ee-4aa6-9399-a35fbb883510" xsi:nil="true"/>
+  </documentManagement>
+</p:properties>
+</file>
+
+<file path=customXml/item3.xml><?xml version="1.0" encoding="utf-8"?>
 <?mso-contentType ?>
 <FormTemplates xmlns="http://schemas.microsoft.com/sharepoint/v3/contenttype/forms">
   <Display>DocumentLibraryForm</Display>
   <Edit>DocumentLibraryForm</Edit>
   <New>DocumentLibraryForm</New>
 </FormTemplates>
-</file>
-
-<file path=customXml/item3.xml><?xml version="1.0" encoding="utf-8"?>
-<p:properties xmlns:p="http://schemas.microsoft.com/office/2006/metadata/properties" xmlns:xsi="http://www.w3.org/2001/XMLSchema-instance" xmlns:pc="http://schemas.microsoft.com/office/infopath/2007/PartnerControls">
-  <documentManagement>
-    <_activity xmlns="92c41bee-f0ee-4aa6-9399-a35fbb883510" xsi:nil="true"/>
-  </documentManagement>
-</p:properties>
 </file>
 
 <file path=customXml/itemProps1.xml><?xml version="1.0" encoding="utf-8"?>
@@ -30243,26 +30227,26 @@
 </file>
 
 <file path=customXml/itemProps2.xml><?xml version="1.0" encoding="utf-8"?>
+<ds:datastoreItem xmlns:ds="http://schemas.openxmlformats.org/officeDocument/2006/customXml" ds:itemID="{D8EDA486-473A-4896-BF03-20A328BFB43D}">
+  <ds:schemaRefs>
+    <ds:schemaRef ds:uri="http://schemas.microsoft.com/office/infopath/2007/PartnerControls"/>
+    <ds:schemaRef ds:uri="http://schemas.openxmlformats.org/package/2006/metadata/core-properties"/>
+    <ds:schemaRef ds:uri="http://purl.org/dc/dcmitype/"/>
+    <ds:schemaRef ds:uri="http://purl.org/dc/elements/1.1/"/>
+    <ds:schemaRef ds:uri="http://schemas.microsoft.com/office/2006/documentManagement/types"/>
+    <ds:schemaRef ds:uri="http://www.w3.org/XML/1998/namespace"/>
+    <ds:schemaRef ds:uri="92c41bee-f0ee-4aa6-9399-a35fbb883510"/>
+    <ds:schemaRef ds:uri="e06ed288-fd75-4b50-bbed-f5a5df88c31c"/>
+    <ds:schemaRef ds:uri="http://schemas.microsoft.com/office/2006/metadata/properties"/>
+    <ds:schemaRef ds:uri="http://purl.org/dc/terms/"/>
+  </ds:schemaRefs>
+</ds:datastoreItem>
+</file>
+
+<file path=customXml/itemProps3.xml><?xml version="1.0" encoding="utf-8"?>
 <ds:datastoreItem xmlns:ds="http://schemas.openxmlformats.org/officeDocument/2006/customXml" ds:itemID="{7D0AC095-0B39-45D2-8F35-EC4BFB49405E}">
   <ds:schemaRefs>
     <ds:schemaRef ds:uri="http://schemas.microsoft.com/sharepoint/v3/contenttype/forms"/>
   </ds:schemaRefs>
 </ds:datastoreItem>
-</file>
-
-<file path=customXml/itemProps3.xml><?xml version="1.0" encoding="utf-8"?>
-<ds:datastoreItem xmlns:ds="http://schemas.openxmlformats.org/officeDocument/2006/customXml" ds:itemID="{D8EDA486-473A-4896-BF03-20A328BFB43D}">
-  <ds:schemaRefs>
-    <ds:schemaRef ds:uri="http://schemas.openxmlformats.org/package/2006/metadata/core-properties"/>
-    <ds:schemaRef ds:uri="http://purl.org/dc/dcmitype/"/>
-    <ds:schemaRef ds:uri="http://purl.org/dc/terms/"/>
-    <ds:schemaRef ds:uri="http://schemas.microsoft.com/office/2006/metadata/properties"/>
-    <ds:schemaRef ds:uri="e06ed288-fd75-4b50-bbed-f5a5df88c31c"/>
-    <ds:schemaRef ds:uri="92c41bee-f0ee-4aa6-9399-a35fbb883510"/>
-    <ds:schemaRef ds:uri="http://schemas.microsoft.com/office/2006/documentManagement/types"/>
-    <ds:schemaRef ds:uri="http://schemas.microsoft.com/office/infopath/2007/PartnerControls"/>
-    <ds:schemaRef ds:uri="http://www.w3.org/XML/1998/namespace"/>
-    <ds:schemaRef ds:uri="http://purl.org/dc/elements/1.1/"/>
-  </ds:schemaRefs>
-</ds:datastoreItem>
 </file>
</xml_diff>